<commit_message>
nieuwe voorbeelden zijn uploaden.
</commit_message>
<xml_diff>
--- a/Presentations/Nederlands/07 - Errors, exception behandeling en testing.pptx
+++ b/Presentations/Nederlands/07 - Errors, exception behandeling en testing.pptx
@@ -2,48 +2,48 @@
 <file path=ppt/presentation.xml><?xml version="1.0" encoding="utf-8"?>
 <p:presentation xmlns:a="http://schemas.openxmlformats.org/drawingml/2006/main" xmlns:r="http://schemas.openxmlformats.org/officeDocument/2006/relationships" xmlns:p="http://schemas.openxmlformats.org/presentationml/2006/main" strictFirstAndLastChars="0" embedTrueTypeFonts="1" saveSubsetFonts="1" autoCompressPictures="0">
   <p:sldMasterIdLst>
-    <p:sldMasterId id="2147483659" r:id="rId1"/>
-    <p:sldMasterId id="2147483660" r:id="rId2"/>
+    <p:sldMasterId id="2147483659" r:id="rId4"/>
+    <p:sldMasterId id="2147483660" r:id="rId5"/>
   </p:sldMasterIdLst>
   <p:notesMasterIdLst>
-    <p:notesMasterId r:id="rId14"/>
+    <p:notesMasterId r:id="rId17"/>
   </p:notesMasterIdLst>
   <p:sldIdLst>
-    <p:sldId id="275" r:id="rId3"/>
-    <p:sldId id="256" r:id="rId4"/>
-    <p:sldId id="257" r:id="rId5"/>
-    <p:sldId id="258" r:id="rId6"/>
-    <p:sldId id="259" r:id="rId7"/>
-    <p:sldId id="260" r:id="rId8"/>
-    <p:sldId id="261" r:id="rId9"/>
-    <p:sldId id="262" r:id="rId10"/>
-    <p:sldId id="263" r:id="rId11"/>
-    <p:sldId id="266" r:id="rId12"/>
-    <p:sldId id="267" r:id="rId13"/>
+    <p:sldId id="275" r:id="rId6"/>
+    <p:sldId id="256" r:id="rId7"/>
+    <p:sldId id="257" r:id="rId8"/>
+    <p:sldId id="258" r:id="rId9"/>
+    <p:sldId id="259" r:id="rId10"/>
+    <p:sldId id="260" r:id="rId11"/>
+    <p:sldId id="261" r:id="rId12"/>
+    <p:sldId id="262" r:id="rId13"/>
+    <p:sldId id="263" r:id="rId14"/>
+    <p:sldId id="266" r:id="rId15"/>
+    <p:sldId id="267" r:id="rId16"/>
   </p:sldIdLst>
   <p:sldSz cx="9906000" cy="6858000" type="A4"/>
   <p:notesSz cx="6858000" cy="9144000"/>
   <p:embeddedFontLst>
     <p:embeddedFont>
       <p:font typeface="Calibri" panose="020F0502020204030204" pitchFamily="34" charset="0"/>
-      <p:regular r:id="rId15"/>
-      <p:bold r:id="rId16"/>
-      <p:italic r:id="rId17"/>
-      <p:boldItalic r:id="rId18"/>
+      <p:regular r:id="rId18"/>
+      <p:bold r:id="rId19"/>
+      <p:italic r:id="rId20"/>
+      <p:boldItalic r:id="rId21"/>
     </p:embeddedFont>
     <p:embeddedFont>
       <p:font typeface="Cascadia Mono" panose="020B0609020000020004" pitchFamily="49" charset="0"/>
-      <p:regular r:id="rId19"/>
-      <p:bold r:id="rId20"/>
-      <p:italic r:id="rId21"/>
-      <p:boldItalic r:id="rId22"/>
+      <p:regular r:id="rId22"/>
+      <p:bold r:id="rId23"/>
+      <p:italic r:id="rId24"/>
+      <p:boldItalic r:id="rId25"/>
     </p:embeddedFont>
     <p:embeddedFont>
       <p:font typeface="Montserrat" panose="00000500000000000000" pitchFamily="2" charset="0"/>
-      <p:regular r:id="rId23"/>
-      <p:bold r:id="rId24"/>
-      <p:italic r:id="rId25"/>
-      <p:boldItalic r:id="rId26"/>
+      <p:regular r:id="rId26"/>
+      <p:bold r:id="rId27"/>
+      <p:italic r:id="rId28"/>
+      <p:boldItalic r:id="rId29"/>
     </p:embeddedFont>
   </p:embeddedFontLst>
   <p:defaultTextStyle>
@@ -9226,13 +9226,13 @@
   <p:clrMapOvr>
     <a:overrideClrMapping bg1="dk1" tx1="lt1" bg2="dk2" tx2="lt2" accent1="accent1" accent2="accent2" accent3="accent3" accent4="accent4" accent5="accent5" accent6="accent6" hlink="hlink" folHlink="folHlink"/>
   </p:clrMapOvr>
-  <mc:AlternateContent xmlns:mc="http://schemas.openxmlformats.org/markup-compatibility/2006">
-    <mc:Choice xmlns:p14="http://schemas.microsoft.com/office/powerpoint/2010/main" Requires="p14">
+  <mc:AlternateContent xmlns:mc="http://schemas.openxmlformats.org/markup-compatibility/2006" xmlns:p14="http://schemas.microsoft.com/office/powerpoint/2010/main">
+    <mc:Choice Requires="p14">
       <p:transition spd="slow" p14:dur="1500">
         <p:random/>
       </p:transition>
     </mc:Choice>
-    <mc:Fallback>
+    <mc:Fallback xmlns="">
       <p:transition spd="slow">
         <p:random/>
       </p:transition>
@@ -9771,298 +9771,6 @@
                 <a:sym typeface="Montserrat"/>
               </a:rPr>
               <a:t>Python Fundamentals – Les016</a:t>
-            </a:r>
-          </a:p>
-        </p:txBody>
-      </p:sp>
-      <p:sp>
-        <p:nvSpPr>
-          <p:cNvPr id="10" name="Google Shape;69;p15">
-            <a:extLst>
-              <a:ext uri="{FF2B5EF4-FFF2-40B4-BE49-F238E27FC236}">
-                <a16:creationId xmlns:a16="http://schemas.microsoft.com/office/drawing/2014/main" id="{4795E21E-A36A-41F4-B79E-F0F4B176327B}"/>
-              </a:ext>
-            </a:extLst>
-          </p:cNvPr>
-          <p:cNvSpPr txBox="1">
-            <a:spLocks/>
-          </p:cNvSpPr>
-          <p:nvPr/>
-        </p:nvSpPr>
-        <p:spPr>
-          <a:xfrm>
-            <a:off x="317513" y="6163056"/>
-            <a:ext cx="3140592" cy="438149"/>
-          </a:xfrm>
-          <a:prstGeom prst="rect">
-            <a:avLst/>
-          </a:prstGeom>
-          <a:noFill/>
-          <a:ln>
-            <a:noFill/>
-          </a:ln>
-        </p:spPr>
-        <p:txBody>
-          <a:bodyPr spcFirstLastPara="1" wrap="square" lIns="91425" tIns="91425" rIns="91425" bIns="91425" anchor="t" anchorCtr="0">
-            <a:noAutofit/>
-          </a:bodyPr>
-          <a:lstStyle>
-            <a:defPPr marR="0" lvl="0" algn="l" rtl="0">
-              <a:lnSpc>
-                <a:spcPct val="100000"/>
-              </a:lnSpc>
-              <a:spcBef>
-                <a:spcPts val="0"/>
-              </a:spcBef>
-              <a:spcAft>
-                <a:spcPts val="0"/>
-              </a:spcAft>
-            </a:defPPr>
-            <a:lvl1pPr marR="0" lvl="0" algn="ctr" rtl="0">
-              <a:lnSpc>
-                <a:spcPct val="100000"/>
-              </a:lnSpc>
-              <a:spcBef>
-                <a:spcPts val="0"/>
-              </a:spcBef>
-              <a:spcAft>
-                <a:spcPts val="0"/>
-              </a:spcAft>
-              <a:buClr>
-                <a:schemeClr val="dk1"/>
-              </a:buClr>
-              <a:buSzPts val="5200"/>
-              <a:buFont typeface="Arial"/>
-              <a:buNone/>
-              <a:defRPr sz="5200" b="0" i="0" u="none" strike="noStrike" cap="none">
-                <a:solidFill>
-                  <a:schemeClr val="dk1"/>
-                </a:solidFill>
-                <a:latin typeface="Arial"/>
-                <a:ea typeface="Arial"/>
-                <a:cs typeface="Arial"/>
-                <a:sym typeface="Arial"/>
-              </a:defRPr>
-            </a:lvl1pPr>
-            <a:lvl2pPr marR="0" lvl="1" algn="ctr" rtl="0">
-              <a:lnSpc>
-                <a:spcPct val="100000"/>
-              </a:lnSpc>
-              <a:spcBef>
-                <a:spcPts val="0"/>
-              </a:spcBef>
-              <a:spcAft>
-                <a:spcPts val="0"/>
-              </a:spcAft>
-              <a:buClr>
-                <a:schemeClr val="dk1"/>
-              </a:buClr>
-              <a:buSzPts val="5200"/>
-              <a:buFont typeface="Arial"/>
-              <a:buNone/>
-              <a:defRPr sz="5200" b="0" i="0" u="none" strike="noStrike" cap="none">
-                <a:solidFill>
-                  <a:schemeClr val="dk1"/>
-                </a:solidFill>
-                <a:latin typeface="Arial"/>
-                <a:ea typeface="Arial"/>
-                <a:cs typeface="Arial"/>
-                <a:sym typeface="Arial"/>
-              </a:defRPr>
-            </a:lvl2pPr>
-            <a:lvl3pPr marR="0" lvl="2" algn="ctr" rtl="0">
-              <a:lnSpc>
-                <a:spcPct val="100000"/>
-              </a:lnSpc>
-              <a:spcBef>
-                <a:spcPts val="0"/>
-              </a:spcBef>
-              <a:spcAft>
-                <a:spcPts val="0"/>
-              </a:spcAft>
-              <a:buClr>
-                <a:schemeClr val="dk1"/>
-              </a:buClr>
-              <a:buSzPts val="5200"/>
-              <a:buFont typeface="Arial"/>
-              <a:buNone/>
-              <a:defRPr sz="5200" b="0" i="0" u="none" strike="noStrike" cap="none">
-                <a:solidFill>
-                  <a:schemeClr val="dk1"/>
-                </a:solidFill>
-                <a:latin typeface="Arial"/>
-                <a:ea typeface="Arial"/>
-                <a:cs typeface="Arial"/>
-                <a:sym typeface="Arial"/>
-              </a:defRPr>
-            </a:lvl3pPr>
-            <a:lvl4pPr marR="0" lvl="3" algn="ctr" rtl="0">
-              <a:lnSpc>
-                <a:spcPct val="100000"/>
-              </a:lnSpc>
-              <a:spcBef>
-                <a:spcPts val="0"/>
-              </a:spcBef>
-              <a:spcAft>
-                <a:spcPts val="0"/>
-              </a:spcAft>
-              <a:buClr>
-                <a:schemeClr val="dk1"/>
-              </a:buClr>
-              <a:buSzPts val="5200"/>
-              <a:buFont typeface="Arial"/>
-              <a:buNone/>
-              <a:defRPr sz="5200" b="0" i="0" u="none" strike="noStrike" cap="none">
-                <a:solidFill>
-                  <a:schemeClr val="dk1"/>
-                </a:solidFill>
-                <a:latin typeface="Arial"/>
-                <a:ea typeface="Arial"/>
-                <a:cs typeface="Arial"/>
-                <a:sym typeface="Arial"/>
-              </a:defRPr>
-            </a:lvl4pPr>
-            <a:lvl5pPr marR="0" lvl="4" algn="ctr" rtl="0">
-              <a:lnSpc>
-                <a:spcPct val="100000"/>
-              </a:lnSpc>
-              <a:spcBef>
-                <a:spcPts val="0"/>
-              </a:spcBef>
-              <a:spcAft>
-                <a:spcPts val="0"/>
-              </a:spcAft>
-              <a:buClr>
-                <a:schemeClr val="dk1"/>
-              </a:buClr>
-              <a:buSzPts val="5200"/>
-              <a:buFont typeface="Arial"/>
-              <a:buNone/>
-              <a:defRPr sz="5200" b="0" i="0" u="none" strike="noStrike" cap="none">
-                <a:solidFill>
-                  <a:schemeClr val="dk1"/>
-                </a:solidFill>
-                <a:latin typeface="Arial"/>
-                <a:ea typeface="Arial"/>
-                <a:cs typeface="Arial"/>
-                <a:sym typeface="Arial"/>
-              </a:defRPr>
-            </a:lvl5pPr>
-            <a:lvl6pPr marR="0" lvl="5" algn="ctr" rtl="0">
-              <a:lnSpc>
-                <a:spcPct val="100000"/>
-              </a:lnSpc>
-              <a:spcBef>
-                <a:spcPts val="0"/>
-              </a:spcBef>
-              <a:spcAft>
-                <a:spcPts val="0"/>
-              </a:spcAft>
-              <a:buClr>
-                <a:schemeClr val="dk1"/>
-              </a:buClr>
-              <a:buSzPts val="5200"/>
-              <a:buFont typeface="Arial"/>
-              <a:buNone/>
-              <a:defRPr sz="5200" b="0" i="0" u="none" strike="noStrike" cap="none">
-                <a:solidFill>
-                  <a:schemeClr val="dk1"/>
-                </a:solidFill>
-                <a:latin typeface="Arial"/>
-                <a:ea typeface="Arial"/>
-                <a:cs typeface="Arial"/>
-                <a:sym typeface="Arial"/>
-              </a:defRPr>
-            </a:lvl6pPr>
-            <a:lvl7pPr marR="0" lvl="6" algn="ctr" rtl="0">
-              <a:lnSpc>
-                <a:spcPct val="100000"/>
-              </a:lnSpc>
-              <a:spcBef>
-                <a:spcPts val="0"/>
-              </a:spcBef>
-              <a:spcAft>
-                <a:spcPts val="0"/>
-              </a:spcAft>
-              <a:buClr>
-                <a:schemeClr val="dk1"/>
-              </a:buClr>
-              <a:buSzPts val="5200"/>
-              <a:buFont typeface="Arial"/>
-              <a:buNone/>
-              <a:defRPr sz="5200" b="0" i="0" u="none" strike="noStrike" cap="none">
-                <a:solidFill>
-                  <a:schemeClr val="dk1"/>
-                </a:solidFill>
-                <a:latin typeface="Arial"/>
-                <a:ea typeface="Arial"/>
-                <a:cs typeface="Arial"/>
-                <a:sym typeface="Arial"/>
-              </a:defRPr>
-            </a:lvl7pPr>
-            <a:lvl8pPr marR="0" lvl="7" algn="ctr" rtl="0">
-              <a:lnSpc>
-                <a:spcPct val="100000"/>
-              </a:lnSpc>
-              <a:spcBef>
-                <a:spcPts val="0"/>
-              </a:spcBef>
-              <a:spcAft>
-                <a:spcPts val="0"/>
-              </a:spcAft>
-              <a:buClr>
-                <a:schemeClr val="dk1"/>
-              </a:buClr>
-              <a:buSzPts val="5200"/>
-              <a:buFont typeface="Arial"/>
-              <a:buNone/>
-              <a:defRPr sz="5200" b="0" i="0" u="none" strike="noStrike" cap="none">
-                <a:solidFill>
-                  <a:schemeClr val="dk1"/>
-                </a:solidFill>
-                <a:latin typeface="Arial"/>
-                <a:ea typeface="Arial"/>
-                <a:cs typeface="Arial"/>
-                <a:sym typeface="Arial"/>
-              </a:defRPr>
-            </a:lvl8pPr>
-            <a:lvl9pPr marR="0" lvl="8" algn="ctr" rtl="0">
-              <a:lnSpc>
-                <a:spcPct val="100000"/>
-              </a:lnSpc>
-              <a:spcBef>
-                <a:spcPts val="0"/>
-              </a:spcBef>
-              <a:spcAft>
-                <a:spcPts val="0"/>
-              </a:spcAft>
-              <a:buClr>
-                <a:schemeClr val="dk1"/>
-              </a:buClr>
-              <a:buSzPts val="5200"/>
-              <a:buFont typeface="Arial"/>
-              <a:buNone/>
-              <a:defRPr sz="5200" b="0" i="0" u="none" strike="noStrike" cap="none">
-                <a:solidFill>
-                  <a:schemeClr val="dk1"/>
-                </a:solidFill>
-                <a:latin typeface="Arial"/>
-                <a:ea typeface="Arial"/>
-                <a:cs typeface="Arial"/>
-                <a:sym typeface="Arial"/>
-              </a:defRPr>
-            </a:lvl9pPr>
-          </a:lstStyle>
-          <a:p>
-            <a:pPr algn="l"/>
-            <a:r>
-              <a:rPr lang="nl-BE" sz="1400" dirty="0">
-                <a:latin typeface="Cascadia Mono" panose="020B0609020000020004" pitchFamily="49" charset="0"/>
-                <a:ea typeface="Cascadia Mono" panose="020B0609020000020004" pitchFamily="49" charset="0"/>
-                <a:cs typeface="Cascadia Mono" panose="020B0609020000020004" pitchFamily="49" charset="0"/>
-                <a:sym typeface="Montserrat"/>
-              </a:rPr>
-              <a:t>01/03/2022</a:t>
             </a:r>
           </a:p>
         </p:txBody>
@@ -10636,298 +10344,6 @@
           </a:p>
         </p:txBody>
       </p:sp>
-      <p:sp>
-        <p:nvSpPr>
-          <p:cNvPr id="8" name="Google Shape;69;p15">
-            <a:extLst>
-              <a:ext uri="{FF2B5EF4-FFF2-40B4-BE49-F238E27FC236}">
-                <a16:creationId xmlns:a16="http://schemas.microsoft.com/office/drawing/2014/main" id="{D7CEB2B2-9099-44BD-B8D3-76EF6EB9C508}"/>
-              </a:ext>
-            </a:extLst>
-          </p:cNvPr>
-          <p:cNvSpPr txBox="1">
-            <a:spLocks/>
-          </p:cNvSpPr>
-          <p:nvPr/>
-        </p:nvSpPr>
-        <p:spPr>
-          <a:xfrm>
-            <a:off x="317513" y="6163056"/>
-            <a:ext cx="3140592" cy="438149"/>
-          </a:xfrm>
-          <a:prstGeom prst="rect">
-            <a:avLst/>
-          </a:prstGeom>
-          <a:noFill/>
-          <a:ln>
-            <a:noFill/>
-          </a:ln>
-        </p:spPr>
-        <p:txBody>
-          <a:bodyPr spcFirstLastPara="1" wrap="square" lIns="91425" tIns="91425" rIns="91425" bIns="91425" anchor="t" anchorCtr="0">
-            <a:noAutofit/>
-          </a:bodyPr>
-          <a:lstStyle>
-            <a:defPPr marR="0" lvl="0" algn="l" rtl="0">
-              <a:lnSpc>
-                <a:spcPct val="100000"/>
-              </a:lnSpc>
-              <a:spcBef>
-                <a:spcPts val="0"/>
-              </a:spcBef>
-              <a:spcAft>
-                <a:spcPts val="0"/>
-              </a:spcAft>
-            </a:defPPr>
-            <a:lvl1pPr marR="0" lvl="0" algn="ctr" rtl="0">
-              <a:lnSpc>
-                <a:spcPct val="100000"/>
-              </a:lnSpc>
-              <a:spcBef>
-                <a:spcPts val="0"/>
-              </a:spcBef>
-              <a:spcAft>
-                <a:spcPts val="0"/>
-              </a:spcAft>
-              <a:buClr>
-                <a:schemeClr val="dk1"/>
-              </a:buClr>
-              <a:buSzPts val="5200"/>
-              <a:buFont typeface="Arial"/>
-              <a:buNone/>
-              <a:defRPr sz="5200" b="0" i="0" u="none" strike="noStrike" cap="none">
-                <a:solidFill>
-                  <a:schemeClr val="dk1"/>
-                </a:solidFill>
-                <a:latin typeface="Arial"/>
-                <a:ea typeface="Arial"/>
-                <a:cs typeface="Arial"/>
-                <a:sym typeface="Arial"/>
-              </a:defRPr>
-            </a:lvl1pPr>
-            <a:lvl2pPr marR="0" lvl="1" algn="ctr" rtl="0">
-              <a:lnSpc>
-                <a:spcPct val="100000"/>
-              </a:lnSpc>
-              <a:spcBef>
-                <a:spcPts val="0"/>
-              </a:spcBef>
-              <a:spcAft>
-                <a:spcPts val="0"/>
-              </a:spcAft>
-              <a:buClr>
-                <a:schemeClr val="dk1"/>
-              </a:buClr>
-              <a:buSzPts val="5200"/>
-              <a:buFont typeface="Arial"/>
-              <a:buNone/>
-              <a:defRPr sz="5200" b="0" i="0" u="none" strike="noStrike" cap="none">
-                <a:solidFill>
-                  <a:schemeClr val="dk1"/>
-                </a:solidFill>
-                <a:latin typeface="Arial"/>
-                <a:ea typeface="Arial"/>
-                <a:cs typeface="Arial"/>
-                <a:sym typeface="Arial"/>
-              </a:defRPr>
-            </a:lvl2pPr>
-            <a:lvl3pPr marR="0" lvl="2" algn="ctr" rtl="0">
-              <a:lnSpc>
-                <a:spcPct val="100000"/>
-              </a:lnSpc>
-              <a:spcBef>
-                <a:spcPts val="0"/>
-              </a:spcBef>
-              <a:spcAft>
-                <a:spcPts val="0"/>
-              </a:spcAft>
-              <a:buClr>
-                <a:schemeClr val="dk1"/>
-              </a:buClr>
-              <a:buSzPts val="5200"/>
-              <a:buFont typeface="Arial"/>
-              <a:buNone/>
-              <a:defRPr sz="5200" b="0" i="0" u="none" strike="noStrike" cap="none">
-                <a:solidFill>
-                  <a:schemeClr val="dk1"/>
-                </a:solidFill>
-                <a:latin typeface="Arial"/>
-                <a:ea typeface="Arial"/>
-                <a:cs typeface="Arial"/>
-                <a:sym typeface="Arial"/>
-              </a:defRPr>
-            </a:lvl3pPr>
-            <a:lvl4pPr marR="0" lvl="3" algn="ctr" rtl="0">
-              <a:lnSpc>
-                <a:spcPct val="100000"/>
-              </a:lnSpc>
-              <a:spcBef>
-                <a:spcPts val="0"/>
-              </a:spcBef>
-              <a:spcAft>
-                <a:spcPts val="0"/>
-              </a:spcAft>
-              <a:buClr>
-                <a:schemeClr val="dk1"/>
-              </a:buClr>
-              <a:buSzPts val="5200"/>
-              <a:buFont typeface="Arial"/>
-              <a:buNone/>
-              <a:defRPr sz="5200" b="0" i="0" u="none" strike="noStrike" cap="none">
-                <a:solidFill>
-                  <a:schemeClr val="dk1"/>
-                </a:solidFill>
-                <a:latin typeface="Arial"/>
-                <a:ea typeface="Arial"/>
-                <a:cs typeface="Arial"/>
-                <a:sym typeface="Arial"/>
-              </a:defRPr>
-            </a:lvl4pPr>
-            <a:lvl5pPr marR="0" lvl="4" algn="ctr" rtl="0">
-              <a:lnSpc>
-                <a:spcPct val="100000"/>
-              </a:lnSpc>
-              <a:spcBef>
-                <a:spcPts val="0"/>
-              </a:spcBef>
-              <a:spcAft>
-                <a:spcPts val="0"/>
-              </a:spcAft>
-              <a:buClr>
-                <a:schemeClr val="dk1"/>
-              </a:buClr>
-              <a:buSzPts val="5200"/>
-              <a:buFont typeface="Arial"/>
-              <a:buNone/>
-              <a:defRPr sz="5200" b="0" i="0" u="none" strike="noStrike" cap="none">
-                <a:solidFill>
-                  <a:schemeClr val="dk1"/>
-                </a:solidFill>
-                <a:latin typeface="Arial"/>
-                <a:ea typeface="Arial"/>
-                <a:cs typeface="Arial"/>
-                <a:sym typeface="Arial"/>
-              </a:defRPr>
-            </a:lvl5pPr>
-            <a:lvl6pPr marR="0" lvl="5" algn="ctr" rtl="0">
-              <a:lnSpc>
-                <a:spcPct val="100000"/>
-              </a:lnSpc>
-              <a:spcBef>
-                <a:spcPts val="0"/>
-              </a:spcBef>
-              <a:spcAft>
-                <a:spcPts val="0"/>
-              </a:spcAft>
-              <a:buClr>
-                <a:schemeClr val="dk1"/>
-              </a:buClr>
-              <a:buSzPts val="5200"/>
-              <a:buFont typeface="Arial"/>
-              <a:buNone/>
-              <a:defRPr sz="5200" b="0" i="0" u="none" strike="noStrike" cap="none">
-                <a:solidFill>
-                  <a:schemeClr val="dk1"/>
-                </a:solidFill>
-                <a:latin typeface="Arial"/>
-                <a:ea typeface="Arial"/>
-                <a:cs typeface="Arial"/>
-                <a:sym typeface="Arial"/>
-              </a:defRPr>
-            </a:lvl6pPr>
-            <a:lvl7pPr marR="0" lvl="6" algn="ctr" rtl="0">
-              <a:lnSpc>
-                <a:spcPct val="100000"/>
-              </a:lnSpc>
-              <a:spcBef>
-                <a:spcPts val="0"/>
-              </a:spcBef>
-              <a:spcAft>
-                <a:spcPts val="0"/>
-              </a:spcAft>
-              <a:buClr>
-                <a:schemeClr val="dk1"/>
-              </a:buClr>
-              <a:buSzPts val="5200"/>
-              <a:buFont typeface="Arial"/>
-              <a:buNone/>
-              <a:defRPr sz="5200" b="0" i="0" u="none" strike="noStrike" cap="none">
-                <a:solidFill>
-                  <a:schemeClr val="dk1"/>
-                </a:solidFill>
-                <a:latin typeface="Arial"/>
-                <a:ea typeface="Arial"/>
-                <a:cs typeface="Arial"/>
-                <a:sym typeface="Arial"/>
-              </a:defRPr>
-            </a:lvl7pPr>
-            <a:lvl8pPr marR="0" lvl="7" algn="ctr" rtl="0">
-              <a:lnSpc>
-                <a:spcPct val="100000"/>
-              </a:lnSpc>
-              <a:spcBef>
-                <a:spcPts val="0"/>
-              </a:spcBef>
-              <a:spcAft>
-                <a:spcPts val="0"/>
-              </a:spcAft>
-              <a:buClr>
-                <a:schemeClr val="dk1"/>
-              </a:buClr>
-              <a:buSzPts val="5200"/>
-              <a:buFont typeface="Arial"/>
-              <a:buNone/>
-              <a:defRPr sz="5200" b="0" i="0" u="none" strike="noStrike" cap="none">
-                <a:solidFill>
-                  <a:schemeClr val="dk1"/>
-                </a:solidFill>
-                <a:latin typeface="Arial"/>
-                <a:ea typeface="Arial"/>
-                <a:cs typeface="Arial"/>
-                <a:sym typeface="Arial"/>
-              </a:defRPr>
-            </a:lvl8pPr>
-            <a:lvl9pPr marR="0" lvl="8" algn="ctr" rtl="0">
-              <a:lnSpc>
-                <a:spcPct val="100000"/>
-              </a:lnSpc>
-              <a:spcBef>
-                <a:spcPts val="0"/>
-              </a:spcBef>
-              <a:spcAft>
-                <a:spcPts val="0"/>
-              </a:spcAft>
-              <a:buClr>
-                <a:schemeClr val="dk1"/>
-              </a:buClr>
-              <a:buSzPts val="5200"/>
-              <a:buFont typeface="Arial"/>
-              <a:buNone/>
-              <a:defRPr sz="5200" b="0" i="0" u="none" strike="noStrike" cap="none">
-                <a:solidFill>
-                  <a:schemeClr val="dk1"/>
-                </a:solidFill>
-                <a:latin typeface="Arial"/>
-                <a:ea typeface="Arial"/>
-                <a:cs typeface="Arial"/>
-                <a:sym typeface="Arial"/>
-              </a:defRPr>
-            </a:lvl9pPr>
-          </a:lstStyle>
-          <a:p>
-            <a:pPr algn="l"/>
-            <a:r>
-              <a:rPr lang="nl-BE" sz="1400" dirty="0">
-                <a:latin typeface="Cascadia Mono" panose="020B0609020000020004" pitchFamily="49" charset="0"/>
-                <a:ea typeface="Cascadia Mono" panose="020B0609020000020004" pitchFamily="49" charset="0"/>
-                <a:cs typeface="Cascadia Mono" panose="020B0609020000020004" pitchFamily="49" charset="0"/>
-                <a:sym typeface="Montserrat"/>
-              </a:rPr>
-              <a:t>01/03/2022</a:t>
-            </a:r>
-          </a:p>
-        </p:txBody>
-      </p:sp>
     </p:spTree>
   </p:cSld>
   <p:clrMapOvr>
@@ -11441,298 +10857,6 @@
           </a:p>
         </p:txBody>
       </p:sp>
-      <p:sp>
-        <p:nvSpPr>
-          <p:cNvPr id="11" name="Google Shape;69;p15">
-            <a:extLst>
-              <a:ext uri="{FF2B5EF4-FFF2-40B4-BE49-F238E27FC236}">
-                <a16:creationId xmlns:a16="http://schemas.microsoft.com/office/drawing/2014/main" id="{A387C139-456B-42FB-9427-6605EF297366}"/>
-              </a:ext>
-            </a:extLst>
-          </p:cNvPr>
-          <p:cNvSpPr txBox="1">
-            <a:spLocks/>
-          </p:cNvSpPr>
-          <p:nvPr/>
-        </p:nvSpPr>
-        <p:spPr>
-          <a:xfrm>
-            <a:off x="317513" y="6163056"/>
-            <a:ext cx="3140592" cy="438149"/>
-          </a:xfrm>
-          <a:prstGeom prst="rect">
-            <a:avLst/>
-          </a:prstGeom>
-          <a:noFill/>
-          <a:ln>
-            <a:noFill/>
-          </a:ln>
-        </p:spPr>
-        <p:txBody>
-          <a:bodyPr spcFirstLastPara="1" wrap="square" lIns="91425" tIns="91425" rIns="91425" bIns="91425" anchor="t" anchorCtr="0">
-            <a:noAutofit/>
-          </a:bodyPr>
-          <a:lstStyle>
-            <a:defPPr marR="0" lvl="0" algn="l" rtl="0">
-              <a:lnSpc>
-                <a:spcPct val="100000"/>
-              </a:lnSpc>
-              <a:spcBef>
-                <a:spcPts val="0"/>
-              </a:spcBef>
-              <a:spcAft>
-                <a:spcPts val="0"/>
-              </a:spcAft>
-            </a:defPPr>
-            <a:lvl1pPr marR="0" lvl="0" algn="ctr" rtl="0">
-              <a:lnSpc>
-                <a:spcPct val="100000"/>
-              </a:lnSpc>
-              <a:spcBef>
-                <a:spcPts val="0"/>
-              </a:spcBef>
-              <a:spcAft>
-                <a:spcPts val="0"/>
-              </a:spcAft>
-              <a:buClr>
-                <a:schemeClr val="dk1"/>
-              </a:buClr>
-              <a:buSzPts val="5200"/>
-              <a:buFont typeface="Arial"/>
-              <a:buNone/>
-              <a:defRPr sz="5200" b="0" i="0" u="none" strike="noStrike" cap="none">
-                <a:solidFill>
-                  <a:schemeClr val="dk1"/>
-                </a:solidFill>
-                <a:latin typeface="Arial"/>
-                <a:ea typeface="Arial"/>
-                <a:cs typeface="Arial"/>
-                <a:sym typeface="Arial"/>
-              </a:defRPr>
-            </a:lvl1pPr>
-            <a:lvl2pPr marR="0" lvl="1" algn="ctr" rtl="0">
-              <a:lnSpc>
-                <a:spcPct val="100000"/>
-              </a:lnSpc>
-              <a:spcBef>
-                <a:spcPts val="0"/>
-              </a:spcBef>
-              <a:spcAft>
-                <a:spcPts val="0"/>
-              </a:spcAft>
-              <a:buClr>
-                <a:schemeClr val="dk1"/>
-              </a:buClr>
-              <a:buSzPts val="5200"/>
-              <a:buFont typeface="Arial"/>
-              <a:buNone/>
-              <a:defRPr sz="5200" b="0" i="0" u="none" strike="noStrike" cap="none">
-                <a:solidFill>
-                  <a:schemeClr val="dk1"/>
-                </a:solidFill>
-                <a:latin typeface="Arial"/>
-                <a:ea typeface="Arial"/>
-                <a:cs typeface="Arial"/>
-                <a:sym typeface="Arial"/>
-              </a:defRPr>
-            </a:lvl2pPr>
-            <a:lvl3pPr marR="0" lvl="2" algn="ctr" rtl="0">
-              <a:lnSpc>
-                <a:spcPct val="100000"/>
-              </a:lnSpc>
-              <a:spcBef>
-                <a:spcPts val="0"/>
-              </a:spcBef>
-              <a:spcAft>
-                <a:spcPts val="0"/>
-              </a:spcAft>
-              <a:buClr>
-                <a:schemeClr val="dk1"/>
-              </a:buClr>
-              <a:buSzPts val="5200"/>
-              <a:buFont typeface="Arial"/>
-              <a:buNone/>
-              <a:defRPr sz="5200" b="0" i="0" u="none" strike="noStrike" cap="none">
-                <a:solidFill>
-                  <a:schemeClr val="dk1"/>
-                </a:solidFill>
-                <a:latin typeface="Arial"/>
-                <a:ea typeface="Arial"/>
-                <a:cs typeface="Arial"/>
-                <a:sym typeface="Arial"/>
-              </a:defRPr>
-            </a:lvl3pPr>
-            <a:lvl4pPr marR="0" lvl="3" algn="ctr" rtl="0">
-              <a:lnSpc>
-                <a:spcPct val="100000"/>
-              </a:lnSpc>
-              <a:spcBef>
-                <a:spcPts val="0"/>
-              </a:spcBef>
-              <a:spcAft>
-                <a:spcPts val="0"/>
-              </a:spcAft>
-              <a:buClr>
-                <a:schemeClr val="dk1"/>
-              </a:buClr>
-              <a:buSzPts val="5200"/>
-              <a:buFont typeface="Arial"/>
-              <a:buNone/>
-              <a:defRPr sz="5200" b="0" i="0" u="none" strike="noStrike" cap="none">
-                <a:solidFill>
-                  <a:schemeClr val="dk1"/>
-                </a:solidFill>
-                <a:latin typeface="Arial"/>
-                <a:ea typeface="Arial"/>
-                <a:cs typeface="Arial"/>
-                <a:sym typeface="Arial"/>
-              </a:defRPr>
-            </a:lvl4pPr>
-            <a:lvl5pPr marR="0" lvl="4" algn="ctr" rtl="0">
-              <a:lnSpc>
-                <a:spcPct val="100000"/>
-              </a:lnSpc>
-              <a:spcBef>
-                <a:spcPts val="0"/>
-              </a:spcBef>
-              <a:spcAft>
-                <a:spcPts val="0"/>
-              </a:spcAft>
-              <a:buClr>
-                <a:schemeClr val="dk1"/>
-              </a:buClr>
-              <a:buSzPts val="5200"/>
-              <a:buFont typeface="Arial"/>
-              <a:buNone/>
-              <a:defRPr sz="5200" b="0" i="0" u="none" strike="noStrike" cap="none">
-                <a:solidFill>
-                  <a:schemeClr val="dk1"/>
-                </a:solidFill>
-                <a:latin typeface="Arial"/>
-                <a:ea typeface="Arial"/>
-                <a:cs typeface="Arial"/>
-                <a:sym typeface="Arial"/>
-              </a:defRPr>
-            </a:lvl5pPr>
-            <a:lvl6pPr marR="0" lvl="5" algn="ctr" rtl="0">
-              <a:lnSpc>
-                <a:spcPct val="100000"/>
-              </a:lnSpc>
-              <a:spcBef>
-                <a:spcPts val="0"/>
-              </a:spcBef>
-              <a:spcAft>
-                <a:spcPts val="0"/>
-              </a:spcAft>
-              <a:buClr>
-                <a:schemeClr val="dk1"/>
-              </a:buClr>
-              <a:buSzPts val="5200"/>
-              <a:buFont typeface="Arial"/>
-              <a:buNone/>
-              <a:defRPr sz="5200" b="0" i="0" u="none" strike="noStrike" cap="none">
-                <a:solidFill>
-                  <a:schemeClr val="dk1"/>
-                </a:solidFill>
-                <a:latin typeface="Arial"/>
-                <a:ea typeface="Arial"/>
-                <a:cs typeface="Arial"/>
-                <a:sym typeface="Arial"/>
-              </a:defRPr>
-            </a:lvl6pPr>
-            <a:lvl7pPr marR="0" lvl="6" algn="ctr" rtl="0">
-              <a:lnSpc>
-                <a:spcPct val="100000"/>
-              </a:lnSpc>
-              <a:spcBef>
-                <a:spcPts val="0"/>
-              </a:spcBef>
-              <a:spcAft>
-                <a:spcPts val="0"/>
-              </a:spcAft>
-              <a:buClr>
-                <a:schemeClr val="dk1"/>
-              </a:buClr>
-              <a:buSzPts val="5200"/>
-              <a:buFont typeface="Arial"/>
-              <a:buNone/>
-              <a:defRPr sz="5200" b="0" i="0" u="none" strike="noStrike" cap="none">
-                <a:solidFill>
-                  <a:schemeClr val="dk1"/>
-                </a:solidFill>
-                <a:latin typeface="Arial"/>
-                <a:ea typeface="Arial"/>
-                <a:cs typeface="Arial"/>
-                <a:sym typeface="Arial"/>
-              </a:defRPr>
-            </a:lvl7pPr>
-            <a:lvl8pPr marR="0" lvl="7" algn="ctr" rtl="0">
-              <a:lnSpc>
-                <a:spcPct val="100000"/>
-              </a:lnSpc>
-              <a:spcBef>
-                <a:spcPts val="0"/>
-              </a:spcBef>
-              <a:spcAft>
-                <a:spcPts val="0"/>
-              </a:spcAft>
-              <a:buClr>
-                <a:schemeClr val="dk1"/>
-              </a:buClr>
-              <a:buSzPts val="5200"/>
-              <a:buFont typeface="Arial"/>
-              <a:buNone/>
-              <a:defRPr sz="5200" b="0" i="0" u="none" strike="noStrike" cap="none">
-                <a:solidFill>
-                  <a:schemeClr val="dk1"/>
-                </a:solidFill>
-                <a:latin typeface="Arial"/>
-                <a:ea typeface="Arial"/>
-                <a:cs typeface="Arial"/>
-                <a:sym typeface="Arial"/>
-              </a:defRPr>
-            </a:lvl8pPr>
-            <a:lvl9pPr marR="0" lvl="8" algn="ctr" rtl="0">
-              <a:lnSpc>
-                <a:spcPct val="100000"/>
-              </a:lnSpc>
-              <a:spcBef>
-                <a:spcPts val="0"/>
-              </a:spcBef>
-              <a:spcAft>
-                <a:spcPts val="0"/>
-              </a:spcAft>
-              <a:buClr>
-                <a:schemeClr val="dk1"/>
-              </a:buClr>
-              <a:buSzPts val="5200"/>
-              <a:buFont typeface="Arial"/>
-              <a:buNone/>
-              <a:defRPr sz="5200" b="0" i="0" u="none" strike="noStrike" cap="none">
-                <a:solidFill>
-                  <a:schemeClr val="dk1"/>
-                </a:solidFill>
-                <a:latin typeface="Arial"/>
-                <a:ea typeface="Arial"/>
-                <a:cs typeface="Arial"/>
-                <a:sym typeface="Arial"/>
-              </a:defRPr>
-            </a:lvl9pPr>
-          </a:lstStyle>
-          <a:p>
-            <a:pPr algn="l"/>
-            <a:r>
-              <a:rPr lang="nl-BE" sz="1400" dirty="0">
-                <a:latin typeface="Cascadia Mono" panose="020B0609020000020004" pitchFamily="49" charset="0"/>
-                <a:ea typeface="Cascadia Mono" panose="020B0609020000020004" pitchFamily="49" charset="0"/>
-                <a:cs typeface="Cascadia Mono" panose="020B0609020000020004" pitchFamily="49" charset="0"/>
-                <a:sym typeface="Montserrat"/>
-              </a:rPr>
-              <a:t>01/03/2022</a:t>
-            </a:r>
-          </a:p>
-        </p:txBody>
-      </p:sp>
     </p:spTree>
   </p:cSld>
   <p:clrMapOvr>
@@ -12390,298 +11514,6 @@
           </a:p>
         </p:txBody>
       </p:sp>
-      <p:sp>
-        <p:nvSpPr>
-          <p:cNvPr id="11" name="Google Shape;69;p15">
-            <a:extLst>
-              <a:ext uri="{FF2B5EF4-FFF2-40B4-BE49-F238E27FC236}">
-                <a16:creationId xmlns:a16="http://schemas.microsoft.com/office/drawing/2014/main" id="{21FF9A00-6140-4D0C-8AA0-946316C6EB14}"/>
-              </a:ext>
-            </a:extLst>
-          </p:cNvPr>
-          <p:cNvSpPr txBox="1">
-            <a:spLocks/>
-          </p:cNvSpPr>
-          <p:nvPr/>
-        </p:nvSpPr>
-        <p:spPr>
-          <a:xfrm>
-            <a:off x="317513" y="6163056"/>
-            <a:ext cx="3140592" cy="438149"/>
-          </a:xfrm>
-          <a:prstGeom prst="rect">
-            <a:avLst/>
-          </a:prstGeom>
-          <a:noFill/>
-          <a:ln>
-            <a:noFill/>
-          </a:ln>
-        </p:spPr>
-        <p:txBody>
-          <a:bodyPr spcFirstLastPara="1" wrap="square" lIns="91425" tIns="91425" rIns="91425" bIns="91425" anchor="t" anchorCtr="0">
-            <a:noAutofit/>
-          </a:bodyPr>
-          <a:lstStyle>
-            <a:defPPr marR="0" lvl="0" algn="l" rtl="0">
-              <a:lnSpc>
-                <a:spcPct val="100000"/>
-              </a:lnSpc>
-              <a:spcBef>
-                <a:spcPts val="0"/>
-              </a:spcBef>
-              <a:spcAft>
-                <a:spcPts val="0"/>
-              </a:spcAft>
-            </a:defPPr>
-            <a:lvl1pPr marR="0" lvl="0" algn="ctr" rtl="0">
-              <a:lnSpc>
-                <a:spcPct val="100000"/>
-              </a:lnSpc>
-              <a:spcBef>
-                <a:spcPts val="0"/>
-              </a:spcBef>
-              <a:spcAft>
-                <a:spcPts val="0"/>
-              </a:spcAft>
-              <a:buClr>
-                <a:schemeClr val="dk1"/>
-              </a:buClr>
-              <a:buSzPts val="5200"/>
-              <a:buFont typeface="Arial"/>
-              <a:buNone/>
-              <a:defRPr sz="5200" b="0" i="0" u="none" strike="noStrike" cap="none">
-                <a:solidFill>
-                  <a:schemeClr val="dk1"/>
-                </a:solidFill>
-                <a:latin typeface="Arial"/>
-                <a:ea typeface="Arial"/>
-                <a:cs typeface="Arial"/>
-                <a:sym typeface="Arial"/>
-              </a:defRPr>
-            </a:lvl1pPr>
-            <a:lvl2pPr marR="0" lvl="1" algn="ctr" rtl="0">
-              <a:lnSpc>
-                <a:spcPct val="100000"/>
-              </a:lnSpc>
-              <a:spcBef>
-                <a:spcPts val="0"/>
-              </a:spcBef>
-              <a:spcAft>
-                <a:spcPts val="0"/>
-              </a:spcAft>
-              <a:buClr>
-                <a:schemeClr val="dk1"/>
-              </a:buClr>
-              <a:buSzPts val="5200"/>
-              <a:buFont typeface="Arial"/>
-              <a:buNone/>
-              <a:defRPr sz="5200" b="0" i="0" u="none" strike="noStrike" cap="none">
-                <a:solidFill>
-                  <a:schemeClr val="dk1"/>
-                </a:solidFill>
-                <a:latin typeface="Arial"/>
-                <a:ea typeface="Arial"/>
-                <a:cs typeface="Arial"/>
-                <a:sym typeface="Arial"/>
-              </a:defRPr>
-            </a:lvl2pPr>
-            <a:lvl3pPr marR="0" lvl="2" algn="ctr" rtl="0">
-              <a:lnSpc>
-                <a:spcPct val="100000"/>
-              </a:lnSpc>
-              <a:spcBef>
-                <a:spcPts val="0"/>
-              </a:spcBef>
-              <a:spcAft>
-                <a:spcPts val="0"/>
-              </a:spcAft>
-              <a:buClr>
-                <a:schemeClr val="dk1"/>
-              </a:buClr>
-              <a:buSzPts val="5200"/>
-              <a:buFont typeface="Arial"/>
-              <a:buNone/>
-              <a:defRPr sz="5200" b="0" i="0" u="none" strike="noStrike" cap="none">
-                <a:solidFill>
-                  <a:schemeClr val="dk1"/>
-                </a:solidFill>
-                <a:latin typeface="Arial"/>
-                <a:ea typeface="Arial"/>
-                <a:cs typeface="Arial"/>
-                <a:sym typeface="Arial"/>
-              </a:defRPr>
-            </a:lvl3pPr>
-            <a:lvl4pPr marR="0" lvl="3" algn="ctr" rtl="0">
-              <a:lnSpc>
-                <a:spcPct val="100000"/>
-              </a:lnSpc>
-              <a:spcBef>
-                <a:spcPts val="0"/>
-              </a:spcBef>
-              <a:spcAft>
-                <a:spcPts val="0"/>
-              </a:spcAft>
-              <a:buClr>
-                <a:schemeClr val="dk1"/>
-              </a:buClr>
-              <a:buSzPts val="5200"/>
-              <a:buFont typeface="Arial"/>
-              <a:buNone/>
-              <a:defRPr sz="5200" b="0" i="0" u="none" strike="noStrike" cap="none">
-                <a:solidFill>
-                  <a:schemeClr val="dk1"/>
-                </a:solidFill>
-                <a:latin typeface="Arial"/>
-                <a:ea typeface="Arial"/>
-                <a:cs typeface="Arial"/>
-                <a:sym typeface="Arial"/>
-              </a:defRPr>
-            </a:lvl4pPr>
-            <a:lvl5pPr marR="0" lvl="4" algn="ctr" rtl="0">
-              <a:lnSpc>
-                <a:spcPct val="100000"/>
-              </a:lnSpc>
-              <a:spcBef>
-                <a:spcPts val="0"/>
-              </a:spcBef>
-              <a:spcAft>
-                <a:spcPts val="0"/>
-              </a:spcAft>
-              <a:buClr>
-                <a:schemeClr val="dk1"/>
-              </a:buClr>
-              <a:buSzPts val="5200"/>
-              <a:buFont typeface="Arial"/>
-              <a:buNone/>
-              <a:defRPr sz="5200" b="0" i="0" u="none" strike="noStrike" cap="none">
-                <a:solidFill>
-                  <a:schemeClr val="dk1"/>
-                </a:solidFill>
-                <a:latin typeface="Arial"/>
-                <a:ea typeface="Arial"/>
-                <a:cs typeface="Arial"/>
-                <a:sym typeface="Arial"/>
-              </a:defRPr>
-            </a:lvl5pPr>
-            <a:lvl6pPr marR="0" lvl="5" algn="ctr" rtl="0">
-              <a:lnSpc>
-                <a:spcPct val="100000"/>
-              </a:lnSpc>
-              <a:spcBef>
-                <a:spcPts val="0"/>
-              </a:spcBef>
-              <a:spcAft>
-                <a:spcPts val="0"/>
-              </a:spcAft>
-              <a:buClr>
-                <a:schemeClr val="dk1"/>
-              </a:buClr>
-              <a:buSzPts val="5200"/>
-              <a:buFont typeface="Arial"/>
-              <a:buNone/>
-              <a:defRPr sz="5200" b="0" i="0" u="none" strike="noStrike" cap="none">
-                <a:solidFill>
-                  <a:schemeClr val="dk1"/>
-                </a:solidFill>
-                <a:latin typeface="Arial"/>
-                <a:ea typeface="Arial"/>
-                <a:cs typeface="Arial"/>
-                <a:sym typeface="Arial"/>
-              </a:defRPr>
-            </a:lvl6pPr>
-            <a:lvl7pPr marR="0" lvl="6" algn="ctr" rtl="0">
-              <a:lnSpc>
-                <a:spcPct val="100000"/>
-              </a:lnSpc>
-              <a:spcBef>
-                <a:spcPts val="0"/>
-              </a:spcBef>
-              <a:spcAft>
-                <a:spcPts val="0"/>
-              </a:spcAft>
-              <a:buClr>
-                <a:schemeClr val="dk1"/>
-              </a:buClr>
-              <a:buSzPts val="5200"/>
-              <a:buFont typeface="Arial"/>
-              <a:buNone/>
-              <a:defRPr sz="5200" b="0" i="0" u="none" strike="noStrike" cap="none">
-                <a:solidFill>
-                  <a:schemeClr val="dk1"/>
-                </a:solidFill>
-                <a:latin typeface="Arial"/>
-                <a:ea typeface="Arial"/>
-                <a:cs typeface="Arial"/>
-                <a:sym typeface="Arial"/>
-              </a:defRPr>
-            </a:lvl7pPr>
-            <a:lvl8pPr marR="0" lvl="7" algn="ctr" rtl="0">
-              <a:lnSpc>
-                <a:spcPct val="100000"/>
-              </a:lnSpc>
-              <a:spcBef>
-                <a:spcPts val="0"/>
-              </a:spcBef>
-              <a:spcAft>
-                <a:spcPts val="0"/>
-              </a:spcAft>
-              <a:buClr>
-                <a:schemeClr val="dk1"/>
-              </a:buClr>
-              <a:buSzPts val="5200"/>
-              <a:buFont typeface="Arial"/>
-              <a:buNone/>
-              <a:defRPr sz="5200" b="0" i="0" u="none" strike="noStrike" cap="none">
-                <a:solidFill>
-                  <a:schemeClr val="dk1"/>
-                </a:solidFill>
-                <a:latin typeface="Arial"/>
-                <a:ea typeface="Arial"/>
-                <a:cs typeface="Arial"/>
-                <a:sym typeface="Arial"/>
-              </a:defRPr>
-            </a:lvl8pPr>
-            <a:lvl9pPr marR="0" lvl="8" algn="ctr" rtl="0">
-              <a:lnSpc>
-                <a:spcPct val="100000"/>
-              </a:lnSpc>
-              <a:spcBef>
-                <a:spcPts val="0"/>
-              </a:spcBef>
-              <a:spcAft>
-                <a:spcPts val="0"/>
-              </a:spcAft>
-              <a:buClr>
-                <a:schemeClr val="dk1"/>
-              </a:buClr>
-              <a:buSzPts val="5200"/>
-              <a:buFont typeface="Arial"/>
-              <a:buNone/>
-              <a:defRPr sz="5200" b="0" i="0" u="none" strike="noStrike" cap="none">
-                <a:solidFill>
-                  <a:schemeClr val="dk1"/>
-                </a:solidFill>
-                <a:latin typeface="Arial"/>
-                <a:ea typeface="Arial"/>
-                <a:cs typeface="Arial"/>
-                <a:sym typeface="Arial"/>
-              </a:defRPr>
-            </a:lvl9pPr>
-          </a:lstStyle>
-          <a:p>
-            <a:pPr algn="l"/>
-            <a:r>
-              <a:rPr lang="nl-BE" sz="1400" dirty="0">
-                <a:latin typeface="Cascadia Mono" panose="020B0609020000020004" pitchFamily="49" charset="0"/>
-                <a:ea typeface="Cascadia Mono" panose="020B0609020000020004" pitchFamily="49" charset="0"/>
-                <a:cs typeface="Cascadia Mono" panose="020B0609020000020004" pitchFamily="49" charset="0"/>
-                <a:sym typeface="Montserrat"/>
-              </a:rPr>
-              <a:t>01/03/2022</a:t>
-            </a:r>
-          </a:p>
-        </p:txBody>
-      </p:sp>
     </p:spTree>
   </p:cSld>
   <p:clrMapOvr>
@@ -13304,298 +12136,6 @@
                 <a:sym typeface="Montserrat"/>
               </a:rPr>
               <a:t>Python Fundamentals – Les016</a:t>
-            </a:r>
-          </a:p>
-        </p:txBody>
-      </p:sp>
-      <p:sp>
-        <p:nvSpPr>
-          <p:cNvPr id="11" name="Google Shape;69;p15">
-            <a:extLst>
-              <a:ext uri="{FF2B5EF4-FFF2-40B4-BE49-F238E27FC236}">
-                <a16:creationId xmlns:a16="http://schemas.microsoft.com/office/drawing/2014/main" id="{2BE4495A-652F-4235-B1BF-96B3E25A5497}"/>
-              </a:ext>
-            </a:extLst>
-          </p:cNvPr>
-          <p:cNvSpPr txBox="1">
-            <a:spLocks/>
-          </p:cNvSpPr>
-          <p:nvPr/>
-        </p:nvSpPr>
-        <p:spPr>
-          <a:xfrm>
-            <a:off x="317513" y="6163056"/>
-            <a:ext cx="3140592" cy="438149"/>
-          </a:xfrm>
-          <a:prstGeom prst="rect">
-            <a:avLst/>
-          </a:prstGeom>
-          <a:noFill/>
-          <a:ln>
-            <a:noFill/>
-          </a:ln>
-        </p:spPr>
-        <p:txBody>
-          <a:bodyPr spcFirstLastPara="1" wrap="square" lIns="91425" tIns="91425" rIns="91425" bIns="91425" anchor="t" anchorCtr="0">
-            <a:noAutofit/>
-          </a:bodyPr>
-          <a:lstStyle>
-            <a:defPPr marR="0" lvl="0" algn="l" rtl="0">
-              <a:lnSpc>
-                <a:spcPct val="100000"/>
-              </a:lnSpc>
-              <a:spcBef>
-                <a:spcPts val="0"/>
-              </a:spcBef>
-              <a:spcAft>
-                <a:spcPts val="0"/>
-              </a:spcAft>
-            </a:defPPr>
-            <a:lvl1pPr marR="0" lvl="0" algn="ctr" rtl="0">
-              <a:lnSpc>
-                <a:spcPct val="100000"/>
-              </a:lnSpc>
-              <a:spcBef>
-                <a:spcPts val="0"/>
-              </a:spcBef>
-              <a:spcAft>
-                <a:spcPts val="0"/>
-              </a:spcAft>
-              <a:buClr>
-                <a:schemeClr val="dk1"/>
-              </a:buClr>
-              <a:buSzPts val="5200"/>
-              <a:buFont typeface="Arial"/>
-              <a:buNone/>
-              <a:defRPr sz="5200" b="0" i="0" u="none" strike="noStrike" cap="none">
-                <a:solidFill>
-                  <a:schemeClr val="dk1"/>
-                </a:solidFill>
-                <a:latin typeface="Arial"/>
-                <a:ea typeface="Arial"/>
-                <a:cs typeface="Arial"/>
-                <a:sym typeface="Arial"/>
-              </a:defRPr>
-            </a:lvl1pPr>
-            <a:lvl2pPr marR="0" lvl="1" algn="ctr" rtl="0">
-              <a:lnSpc>
-                <a:spcPct val="100000"/>
-              </a:lnSpc>
-              <a:spcBef>
-                <a:spcPts val="0"/>
-              </a:spcBef>
-              <a:spcAft>
-                <a:spcPts val="0"/>
-              </a:spcAft>
-              <a:buClr>
-                <a:schemeClr val="dk1"/>
-              </a:buClr>
-              <a:buSzPts val="5200"/>
-              <a:buFont typeface="Arial"/>
-              <a:buNone/>
-              <a:defRPr sz="5200" b="0" i="0" u="none" strike="noStrike" cap="none">
-                <a:solidFill>
-                  <a:schemeClr val="dk1"/>
-                </a:solidFill>
-                <a:latin typeface="Arial"/>
-                <a:ea typeface="Arial"/>
-                <a:cs typeface="Arial"/>
-                <a:sym typeface="Arial"/>
-              </a:defRPr>
-            </a:lvl2pPr>
-            <a:lvl3pPr marR="0" lvl="2" algn="ctr" rtl="0">
-              <a:lnSpc>
-                <a:spcPct val="100000"/>
-              </a:lnSpc>
-              <a:spcBef>
-                <a:spcPts val="0"/>
-              </a:spcBef>
-              <a:spcAft>
-                <a:spcPts val="0"/>
-              </a:spcAft>
-              <a:buClr>
-                <a:schemeClr val="dk1"/>
-              </a:buClr>
-              <a:buSzPts val="5200"/>
-              <a:buFont typeface="Arial"/>
-              <a:buNone/>
-              <a:defRPr sz="5200" b="0" i="0" u="none" strike="noStrike" cap="none">
-                <a:solidFill>
-                  <a:schemeClr val="dk1"/>
-                </a:solidFill>
-                <a:latin typeface="Arial"/>
-                <a:ea typeface="Arial"/>
-                <a:cs typeface="Arial"/>
-                <a:sym typeface="Arial"/>
-              </a:defRPr>
-            </a:lvl3pPr>
-            <a:lvl4pPr marR="0" lvl="3" algn="ctr" rtl="0">
-              <a:lnSpc>
-                <a:spcPct val="100000"/>
-              </a:lnSpc>
-              <a:spcBef>
-                <a:spcPts val="0"/>
-              </a:spcBef>
-              <a:spcAft>
-                <a:spcPts val="0"/>
-              </a:spcAft>
-              <a:buClr>
-                <a:schemeClr val="dk1"/>
-              </a:buClr>
-              <a:buSzPts val="5200"/>
-              <a:buFont typeface="Arial"/>
-              <a:buNone/>
-              <a:defRPr sz="5200" b="0" i="0" u="none" strike="noStrike" cap="none">
-                <a:solidFill>
-                  <a:schemeClr val="dk1"/>
-                </a:solidFill>
-                <a:latin typeface="Arial"/>
-                <a:ea typeface="Arial"/>
-                <a:cs typeface="Arial"/>
-                <a:sym typeface="Arial"/>
-              </a:defRPr>
-            </a:lvl4pPr>
-            <a:lvl5pPr marR="0" lvl="4" algn="ctr" rtl="0">
-              <a:lnSpc>
-                <a:spcPct val="100000"/>
-              </a:lnSpc>
-              <a:spcBef>
-                <a:spcPts val="0"/>
-              </a:spcBef>
-              <a:spcAft>
-                <a:spcPts val="0"/>
-              </a:spcAft>
-              <a:buClr>
-                <a:schemeClr val="dk1"/>
-              </a:buClr>
-              <a:buSzPts val="5200"/>
-              <a:buFont typeface="Arial"/>
-              <a:buNone/>
-              <a:defRPr sz="5200" b="0" i="0" u="none" strike="noStrike" cap="none">
-                <a:solidFill>
-                  <a:schemeClr val="dk1"/>
-                </a:solidFill>
-                <a:latin typeface="Arial"/>
-                <a:ea typeface="Arial"/>
-                <a:cs typeface="Arial"/>
-                <a:sym typeface="Arial"/>
-              </a:defRPr>
-            </a:lvl5pPr>
-            <a:lvl6pPr marR="0" lvl="5" algn="ctr" rtl="0">
-              <a:lnSpc>
-                <a:spcPct val="100000"/>
-              </a:lnSpc>
-              <a:spcBef>
-                <a:spcPts val="0"/>
-              </a:spcBef>
-              <a:spcAft>
-                <a:spcPts val="0"/>
-              </a:spcAft>
-              <a:buClr>
-                <a:schemeClr val="dk1"/>
-              </a:buClr>
-              <a:buSzPts val="5200"/>
-              <a:buFont typeface="Arial"/>
-              <a:buNone/>
-              <a:defRPr sz="5200" b="0" i="0" u="none" strike="noStrike" cap="none">
-                <a:solidFill>
-                  <a:schemeClr val="dk1"/>
-                </a:solidFill>
-                <a:latin typeface="Arial"/>
-                <a:ea typeface="Arial"/>
-                <a:cs typeface="Arial"/>
-                <a:sym typeface="Arial"/>
-              </a:defRPr>
-            </a:lvl6pPr>
-            <a:lvl7pPr marR="0" lvl="6" algn="ctr" rtl="0">
-              <a:lnSpc>
-                <a:spcPct val="100000"/>
-              </a:lnSpc>
-              <a:spcBef>
-                <a:spcPts val="0"/>
-              </a:spcBef>
-              <a:spcAft>
-                <a:spcPts val="0"/>
-              </a:spcAft>
-              <a:buClr>
-                <a:schemeClr val="dk1"/>
-              </a:buClr>
-              <a:buSzPts val="5200"/>
-              <a:buFont typeface="Arial"/>
-              <a:buNone/>
-              <a:defRPr sz="5200" b="0" i="0" u="none" strike="noStrike" cap="none">
-                <a:solidFill>
-                  <a:schemeClr val="dk1"/>
-                </a:solidFill>
-                <a:latin typeface="Arial"/>
-                <a:ea typeface="Arial"/>
-                <a:cs typeface="Arial"/>
-                <a:sym typeface="Arial"/>
-              </a:defRPr>
-            </a:lvl7pPr>
-            <a:lvl8pPr marR="0" lvl="7" algn="ctr" rtl="0">
-              <a:lnSpc>
-                <a:spcPct val="100000"/>
-              </a:lnSpc>
-              <a:spcBef>
-                <a:spcPts val="0"/>
-              </a:spcBef>
-              <a:spcAft>
-                <a:spcPts val="0"/>
-              </a:spcAft>
-              <a:buClr>
-                <a:schemeClr val="dk1"/>
-              </a:buClr>
-              <a:buSzPts val="5200"/>
-              <a:buFont typeface="Arial"/>
-              <a:buNone/>
-              <a:defRPr sz="5200" b="0" i="0" u="none" strike="noStrike" cap="none">
-                <a:solidFill>
-                  <a:schemeClr val="dk1"/>
-                </a:solidFill>
-                <a:latin typeface="Arial"/>
-                <a:ea typeface="Arial"/>
-                <a:cs typeface="Arial"/>
-                <a:sym typeface="Arial"/>
-              </a:defRPr>
-            </a:lvl8pPr>
-            <a:lvl9pPr marR="0" lvl="8" algn="ctr" rtl="0">
-              <a:lnSpc>
-                <a:spcPct val="100000"/>
-              </a:lnSpc>
-              <a:spcBef>
-                <a:spcPts val="0"/>
-              </a:spcBef>
-              <a:spcAft>
-                <a:spcPts val="0"/>
-              </a:spcAft>
-              <a:buClr>
-                <a:schemeClr val="dk1"/>
-              </a:buClr>
-              <a:buSzPts val="5200"/>
-              <a:buFont typeface="Arial"/>
-              <a:buNone/>
-              <a:defRPr sz="5200" b="0" i="0" u="none" strike="noStrike" cap="none">
-                <a:solidFill>
-                  <a:schemeClr val="dk1"/>
-                </a:solidFill>
-                <a:latin typeface="Arial"/>
-                <a:ea typeface="Arial"/>
-                <a:cs typeface="Arial"/>
-                <a:sym typeface="Arial"/>
-              </a:defRPr>
-            </a:lvl9pPr>
-          </a:lstStyle>
-          <a:p>
-            <a:pPr algn="l"/>
-            <a:r>
-              <a:rPr lang="nl-BE" sz="1400" dirty="0">
-                <a:latin typeface="Cascadia Mono" panose="020B0609020000020004" pitchFamily="49" charset="0"/>
-                <a:ea typeface="Cascadia Mono" panose="020B0609020000020004" pitchFamily="49" charset="0"/>
-                <a:cs typeface="Cascadia Mono" panose="020B0609020000020004" pitchFamily="49" charset="0"/>
-                <a:sym typeface="Montserrat"/>
-              </a:rPr>
-              <a:t>01/03/2022</a:t>
             </a:r>
           </a:p>
         </p:txBody>
@@ -14050,298 +12590,6 @@
           </a:p>
         </p:txBody>
       </p:sp>
-      <p:sp>
-        <p:nvSpPr>
-          <p:cNvPr id="10" name="Google Shape;69;p15">
-            <a:extLst>
-              <a:ext uri="{FF2B5EF4-FFF2-40B4-BE49-F238E27FC236}">
-                <a16:creationId xmlns:a16="http://schemas.microsoft.com/office/drawing/2014/main" id="{E30FF4A4-A1C0-4353-B976-9FDF6F7FD98C}"/>
-              </a:ext>
-            </a:extLst>
-          </p:cNvPr>
-          <p:cNvSpPr txBox="1">
-            <a:spLocks/>
-          </p:cNvSpPr>
-          <p:nvPr/>
-        </p:nvSpPr>
-        <p:spPr>
-          <a:xfrm>
-            <a:off x="317513" y="6163056"/>
-            <a:ext cx="3140592" cy="438149"/>
-          </a:xfrm>
-          <a:prstGeom prst="rect">
-            <a:avLst/>
-          </a:prstGeom>
-          <a:noFill/>
-          <a:ln>
-            <a:noFill/>
-          </a:ln>
-        </p:spPr>
-        <p:txBody>
-          <a:bodyPr spcFirstLastPara="1" wrap="square" lIns="91425" tIns="91425" rIns="91425" bIns="91425" anchor="t" anchorCtr="0">
-            <a:noAutofit/>
-          </a:bodyPr>
-          <a:lstStyle>
-            <a:defPPr marR="0" lvl="0" algn="l" rtl="0">
-              <a:lnSpc>
-                <a:spcPct val="100000"/>
-              </a:lnSpc>
-              <a:spcBef>
-                <a:spcPts val="0"/>
-              </a:spcBef>
-              <a:spcAft>
-                <a:spcPts val="0"/>
-              </a:spcAft>
-            </a:defPPr>
-            <a:lvl1pPr marR="0" lvl="0" algn="ctr" rtl="0">
-              <a:lnSpc>
-                <a:spcPct val="100000"/>
-              </a:lnSpc>
-              <a:spcBef>
-                <a:spcPts val="0"/>
-              </a:spcBef>
-              <a:spcAft>
-                <a:spcPts val="0"/>
-              </a:spcAft>
-              <a:buClr>
-                <a:schemeClr val="dk1"/>
-              </a:buClr>
-              <a:buSzPts val="5200"/>
-              <a:buFont typeface="Arial"/>
-              <a:buNone/>
-              <a:defRPr sz="5200" b="0" i="0" u="none" strike="noStrike" cap="none">
-                <a:solidFill>
-                  <a:schemeClr val="dk1"/>
-                </a:solidFill>
-                <a:latin typeface="Arial"/>
-                <a:ea typeface="Arial"/>
-                <a:cs typeface="Arial"/>
-                <a:sym typeface="Arial"/>
-              </a:defRPr>
-            </a:lvl1pPr>
-            <a:lvl2pPr marR="0" lvl="1" algn="ctr" rtl="0">
-              <a:lnSpc>
-                <a:spcPct val="100000"/>
-              </a:lnSpc>
-              <a:spcBef>
-                <a:spcPts val="0"/>
-              </a:spcBef>
-              <a:spcAft>
-                <a:spcPts val="0"/>
-              </a:spcAft>
-              <a:buClr>
-                <a:schemeClr val="dk1"/>
-              </a:buClr>
-              <a:buSzPts val="5200"/>
-              <a:buFont typeface="Arial"/>
-              <a:buNone/>
-              <a:defRPr sz="5200" b="0" i="0" u="none" strike="noStrike" cap="none">
-                <a:solidFill>
-                  <a:schemeClr val="dk1"/>
-                </a:solidFill>
-                <a:latin typeface="Arial"/>
-                <a:ea typeface="Arial"/>
-                <a:cs typeface="Arial"/>
-                <a:sym typeface="Arial"/>
-              </a:defRPr>
-            </a:lvl2pPr>
-            <a:lvl3pPr marR="0" lvl="2" algn="ctr" rtl="0">
-              <a:lnSpc>
-                <a:spcPct val="100000"/>
-              </a:lnSpc>
-              <a:spcBef>
-                <a:spcPts val="0"/>
-              </a:spcBef>
-              <a:spcAft>
-                <a:spcPts val="0"/>
-              </a:spcAft>
-              <a:buClr>
-                <a:schemeClr val="dk1"/>
-              </a:buClr>
-              <a:buSzPts val="5200"/>
-              <a:buFont typeface="Arial"/>
-              <a:buNone/>
-              <a:defRPr sz="5200" b="0" i="0" u="none" strike="noStrike" cap="none">
-                <a:solidFill>
-                  <a:schemeClr val="dk1"/>
-                </a:solidFill>
-                <a:latin typeface="Arial"/>
-                <a:ea typeface="Arial"/>
-                <a:cs typeface="Arial"/>
-                <a:sym typeface="Arial"/>
-              </a:defRPr>
-            </a:lvl3pPr>
-            <a:lvl4pPr marR="0" lvl="3" algn="ctr" rtl="0">
-              <a:lnSpc>
-                <a:spcPct val="100000"/>
-              </a:lnSpc>
-              <a:spcBef>
-                <a:spcPts val="0"/>
-              </a:spcBef>
-              <a:spcAft>
-                <a:spcPts val="0"/>
-              </a:spcAft>
-              <a:buClr>
-                <a:schemeClr val="dk1"/>
-              </a:buClr>
-              <a:buSzPts val="5200"/>
-              <a:buFont typeface="Arial"/>
-              <a:buNone/>
-              <a:defRPr sz="5200" b="0" i="0" u="none" strike="noStrike" cap="none">
-                <a:solidFill>
-                  <a:schemeClr val="dk1"/>
-                </a:solidFill>
-                <a:latin typeface="Arial"/>
-                <a:ea typeface="Arial"/>
-                <a:cs typeface="Arial"/>
-                <a:sym typeface="Arial"/>
-              </a:defRPr>
-            </a:lvl4pPr>
-            <a:lvl5pPr marR="0" lvl="4" algn="ctr" rtl="0">
-              <a:lnSpc>
-                <a:spcPct val="100000"/>
-              </a:lnSpc>
-              <a:spcBef>
-                <a:spcPts val="0"/>
-              </a:spcBef>
-              <a:spcAft>
-                <a:spcPts val="0"/>
-              </a:spcAft>
-              <a:buClr>
-                <a:schemeClr val="dk1"/>
-              </a:buClr>
-              <a:buSzPts val="5200"/>
-              <a:buFont typeface="Arial"/>
-              <a:buNone/>
-              <a:defRPr sz="5200" b="0" i="0" u="none" strike="noStrike" cap="none">
-                <a:solidFill>
-                  <a:schemeClr val="dk1"/>
-                </a:solidFill>
-                <a:latin typeface="Arial"/>
-                <a:ea typeface="Arial"/>
-                <a:cs typeface="Arial"/>
-                <a:sym typeface="Arial"/>
-              </a:defRPr>
-            </a:lvl5pPr>
-            <a:lvl6pPr marR="0" lvl="5" algn="ctr" rtl="0">
-              <a:lnSpc>
-                <a:spcPct val="100000"/>
-              </a:lnSpc>
-              <a:spcBef>
-                <a:spcPts val="0"/>
-              </a:spcBef>
-              <a:spcAft>
-                <a:spcPts val="0"/>
-              </a:spcAft>
-              <a:buClr>
-                <a:schemeClr val="dk1"/>
-              </a:buClr>
-              <a:buSzPts val="5200"/>
-              <a:buFont typeface="Arial"/>
-              <a:buNone/>
-              <a:defRPr sz="5200" b="0" i="0" u="none" strike="noStrike" cap="none">
-                <a:solidFill>
-                  <a:schemeClr val="dk1"/>
-                </a:solidFill>
-                <a:latin typeface="Arial"/>
-                <a:ea typeface="Arial"/>
-                <a:cs typeface="Arial"/>
-                <a:sym typeface="Arial"/>
-              </a:defRPr>
-            </a:lvl6pPr>
-            <a:lvl7pPr marR="0" lvl="6" algn="ctr" rtl="0">
-              <a:lnSpc>
-                <a:spcPct val="100000"/>
-              </a:lnSpc>
-              <a:spcBef>
-                <a:spcPts val="0"/>
-              </a:spcBef>
-              <a:spcAft>
-                <a:spcPts val="0"/>
-              </a:spcAft>
-              <a:buClr>
-                <a:schemeClr val="dk1"/>
-              </a:buClr>
-              <a:buSzPts val="5200"/>
-              <a:buFont typeface="Arial"/>
-              <a:buNone/>
-              <a:defRPr sz="5200" b="0" i="0" u="none" strike="noStrike" cap="none">
-                <a:solidFill>
-                  <a:schemeClr val="dk1"/>
-                </a:solidFill>
-                <a:latin typeface="Arial"/>
-                <a:ea typeface="Arial"/>
-                <a:cs typeface="Arial"/>
-                <a:sym typeface="Arial"/>
-              </a:defRPr>
-            </a:lvl7pPr>
-            <a:lvl8pPr marR="0" lvl="7" algn="ctr" rtl="0">
-              <a:lnSpc>
-                <a:spcPct val="100000"/>
-              </a:lnSpc>
-              <a:spcBef>
-                <a:spcPts val="0"/>
-              </a:spcBef>
-              <a:spcAft>
-                <a:spcPts val="0"/>
-              </a:spcAft>
-              <a:buClr>
-                <a:schemeClr val="dk1"/>
-              </a:buClr>
-              <a:buSzPts val="5200"/>
-              <a:buFont typeface="Arial"/>
-              <a:buNone/>
-              <a:defRPr sz="5200" b="0" i="0" u="none" strike="noStrike" cap="none">
-                <a:solidFill>
-                  <a:schemeClr val="dk1"/>
-                </a:solidFill>
-                <a:latin typeface="Arial"/>
-                <a:ea typeface="Arial"/>
-                <a:cs typeface="Arial"/>
-                <a:sym typeface="Arial"/>
-              </a:defRPr>
-            </a:lvl8pPr>
-            <a:lvl9pPr marR="0" lvl="8" algn="ctr" rtl="0">
-              <a:lnSpc>
-                <a:spcPct val="100000"/>
-              </a:lnSpc>
-              <a:spcBef>
-                <a:spcPts val="0"/>
-              </a:spcBef>
-              <a:spcAft>
-                <a:spcPts val="0"/>
-              </a:spcAft>
-              <a:buClr>
-                <a:schemeClr val="dk1"/>
-              </a:buClr>
-              <a:buSzPts val="5200"/>
-              <a:buFont typeface="Arial"/>
-              <a:buNone/>
-              <a:defRPr sz="5200" b="0" i="0" u="none" strike="noStrike" cap="none">
-                <a:solidFill>
-                  <a:schemeClr val="dk1"/>
-                </a:solidFill>
-                <a:latin typeface="Arial"/>
-                <a:ea typeface="Arial"/>
-                <a:cs typeface="Arial"/>
-                <a:sym typeface="Arial"/>
-              </a:defRPr>
-            </a:lvl9pPr>
-          </a:lstStyle>
-          <a:p>
-            <a:pPr algn="l"/>
-            <a:r>
-              <a:rPr lang="nl-BE" sz="1400" dirty="0">
-                <a:latin typeface="Cascadia Mono" panose="020B0609020000020004" pitchFamily="49" charset="0"/>
-                <a:ea typeface="Cascadia Mono" panose="020B0609020000020004" pitchFamily="49" charset="0"/>
-                <a:cs typeface="Cascadia Mono" panose="020B0609020000020004" pitchFamily="49" charset="0"/>
-                <a:sym typeface="Montserrat"/>
-              </a:rPr>
-              <a:t>01/03/2022</a:t>
-            </a:r>
-          </a:p>
-        </p:txBody>
-      </p:sp>
     </p:spTree>
   </p:cSld>
   <p:clrMapOvr>
@@ -14856,298 +13104,6 @@
           </a:p>
         </p:txBody>
       </p:sp>
-      <p:sp>
-        <p:nvSpPr>
-          <p:cNvPr id="11" name="Google Shape;69;p15">
-            <a:extLst>
-              <a:ext uri="{FF2B5EF4-FFF2-40B4-BE49-F238E27FC236}">
-                <a16:creationId xmlns:a16="http://schemas.microsoft.com/office/drawing/2014/main" id="{AF8DD0DE-1387-4F5B-9554-AB15D5606CB2}"/>
-              </a:ext>
-            </a:extLst>
-          </p:cNvPr>
-          <p:cNvSpPr txBox="1">
-            <a:spLocks/>
-          </p:cNvSpPr>
-          <p:nvPr/>
-        </p:nvSpPr>
-        <p:spPr>
-          <a:xfrm>
-            <a:off x="317513" y="6163056"/>
-            <a:ext cx="3140592" cy="438149"/>
-          </a:xfrm>
-          <a:prstGeom prst="rect">
-            <a:avLst/>
-          </a:prstGeom>
-          <a:noFill/>
-          <a:ln>
-            <a:noFill/>
-          </a:ln>
-        </p:spPr>
-        <p:txBody>
-          <a:bodyPr spcFirstLastPara="1" wrap="square" lIns="91425" tIns="91425" rIns="91425" bIns="91425" anchor="t" anchorCtr="0">
-            <a:noAutofit/>
-          </a:bodyPr>
-          <a:lstStyle>
-            <a:defPPr marR="0" lvl="0" algn="l" rtl="0">
-              <a:lnSpc>
-                <a:spcPct val="100000"/>
-              </a:lnSpc>
-              <a:spcBef>
-                <a:spcPts val="0"/>
-              </a:spcBef>
-              <a:spcAft>
-                <a:spcPts val="0"/>
-              </a:spcAft>
-            </a:defPPr>
-            <a:lvl1pPr marR="0" lvl="0" algn="ctr" rtl="0">
-              <a:lnSpc>
-                <a:spcPct val="100000"/>
-              </a:lnSpc>
-              <a:spcBef>
-                <a:spcPts val="0"/>
-              </a:spcBef>
-              <a:spcAft>
-                <a:spcPts val="0"/>
-              </a:spcAft>
-              <a:buClr>
-                <a:schemeClr val="dk1"/>
-              </a:buClr>
-              <a:buSzPts val="5200"/>
-              <a:buFont typeface="Arial"/>
-              <a:buNone/>
-              <a:defRPr sz="5200" b="0" i="0" u="none" strike="noStrike" cap="none">
-                <a:solidFill>
-                  <a:schemeClr val="dk1"/>
-                </a:solidFill>
-                <a:latin typeface="Arial"/>
-                <a:ea typeface="Arial"/>
-                <a:cs typeface="Arial"/>
-                <a:sym typeface="Arial"/>
-              </a:defRPr>
-            </a:lvl1pPr>
-            <a:lvl2pPr marR="0" lvl="1" algn="ctr" rtl="0">
-              <a:lnSpc>
-                <a:spcPct val="100000"/>
-              </a:lnSpc>
-              <a:spcBef>
-                <a:spcPts val="0"/>
-              </a:spcBef>
-              <a:spcAft>
-                <a:spcPts val="0"/>
-              </a:spcAft>
-              <a:buClr>
-                <a:schemeClr val="dk1"/>
-              </a:buClr>
-              <a:buSzPts val="5200"/>
-              <a:buFont typeface="Arial"/>
-              <a:buNone/>
-              <a:defRPr sz="5200" b="0" i="0" u="none" strike="noStrike" cap="none">
-                <a:solidFill>
-                  <a:schemeClr val="dk1"/>
-                </a:solidFill>
-                <a:latin typeface="Arial"/>
-                <a:ea typeface="Arial"/>
-                <a:cs typeface="Arial"/>
-                <a:sym typeface="Arial"/>
-              </a:defRPr>
-            </a:lvl2pPr>
-            <a:lvl3pPr marR="0" lvl="2" algn="ctr" rtl="0">
-              <a:lnSpc>
-                <a:spcPct val="100000"/>
-              </a:lnSpc>
-              <a:spcBef>
-                <a:spcPts val="0"/>
-              </a:spcBef>
-              <a:spcAft>
-                <a:spcPts val="0"/>
-              </a:spcAft>
-              <a:buClr>
-                <a:schemeClr val="dk1"/>
-              </a:buClr>
-              <a:buSzPts val="5200"/>
-              <a:buFont typeface="Arial"/>
-              <a:buNone/>
-              <a:defRPr sz="5200" b="0" i="0" u="none" strike="noStrike" cap="none">
-                <a:solidFill>
-                  <a:schemeClr val="dk1"/>
-                </a:solidFill>
-                <a:latin typeface="Arial"/>
-                <a:ea typeface="Arial"/>
-                <a:cs typeface="Arial"/>
-                <a:sym typeface="Arial"/>
-              </a:defRPr>
-            </a:lvl3pPr>
-            <a:lvl4pPr marR="0" lvl="3" algn="ctr" rtl="0">
-              <a:lnSpc>
-                <a:spcPct val="100000"/>
-              </a:lnSpc>
-              <a:spcBef>
-                <a:spcPts val="0"/>
-              </a:spcBef>
-              <a:spcAft>
-                <a:spcPts val="0"/>
-              </a:spcAft>
-              <a:buClr>
-                <a:schemeClr val="dk1"/>
-              </a:buClr>
-              <a:buSzPts val="5200"/>
-              <a:buFont typeface="Arial"/>
-              <a:buNone/>
-              <a:defRPr sz="5200" b="0" i="0" u="none" strike="noStrike" cap="none">
-                <a:solidFill>
-                  <a:schemeClr val="dk1"/>
-                </a:solidFill>
-                <a:latin typeface="Arial"/>
-                <a:ea typeface="Arial"/>
-                <a:cs typeface="Arial"/>
-                <a:sym typeface="Arial"/>
-              </a:defRPr>
-            </a:lvl4pPr>
-            <a:lvl5pPr marR="0" lvl="4" algn="ctr" rtl="0">
-              <a:lnSpc>
-                <a:spcPct val="100000"/>
-              </a:lnSpc>
-              <a:spcBef>
-                <a:spcPts val="0"/>
-              </a:spcBef>
-              <a:spcAft>
-                <a:spcPts val="0"/>
-              </a:spcAft>
-              <a:buClr>
-                <a:schemeClr val="dk1"/>
-              </a:buClr>
-              <a:buSzPts val="5200"/>
-              <a:buFont typeface="Arial"/>
-              <a:buNone/>
-              <a:defRPr sz="5200" b="0" i="0" u="none" strike="noStrike" cap="none">
-                <a:solidFill>
-                  <a:schemeClr val="dk1"/>
-                </a:solidFill>
-                <a:latin typeface="Arial"/>
-                <a:ea typeface="Arial"/>
-                <a:cs typeface="Arial"/>
-                <a:sym typeface="Arial"/>
-              </a:defRPr>
-            </a:lvl5pPr>
-            <a:lvl6pPr marR="0" lvl="5" algn="ctr" rtl="0">
-              <a:lnSpc>
-                <a:spcPct val="100000"/>
-              </a:lnSpc>
-              <a:spcBef>
-                <a:spcPts val="0"/>
-              </a:spcBef>
-              <a:spcAft>
-                <a:spcPts val="0"/>
-              </a:spcAft>
-              <a:buClr>
-                <a:schemeClr val="dk1"/>
-              </a:buClr>
-              <a:buSzPts val="5200"/>
-              <a:buFont typeface="Arial"/>
-              <a:buNone/>
-              <a:defRPr sz="5200" b="0" i="0" u="none" strike="noStrike" cap="none">
-                <a:solidFill>
-                  <a:schemeClr val="dk1"/>
-                </a:solidFill>
-                <a:latin typeface="Arial"/>
-                <a:ea typeface="Arial"/>
-                <a:cs typeface="Arial"/>
-                <a:sym typeface="Arial"/>
-              </a:defRPr>
-            </a:lvl6pPr>
-            <a:lvl7pPr marR="0" lvl="6" algn="ctr" rtl="0">
-              <a:lnSpc>
-                <a:spcPct val="100000"/>
-              </a:lnSpc>
-              <a:spcBef>
-                <a:spcPts val="0"/>
-              </a:spcBef>
-              <a:spcAft>
-                <a:spcPts val="0"/>
-              </a:spcAft>
-              <a:buClr>
-                <a:schemeClr val="dk1"/>
-              </a:buClr>
-              <a:buSzPts val="5200"/>
-              <a:buFont typeface="Arial"/>
-              <a:buNone/>
-              <a:defRPr sz="5200" b="0" i="0" u="none" strike="noStrike" cap="none">
-                <a:solidFill>
-                  <a:schemeClr val="dk1"/>
-                </a:solidFill>
-                <a:latin typeface="Arial"/>
-                <a:ea typeface="Arial"/>
-                <a:cs typeface="Arial"/>
-                <a:sym typeface="Arial"/>
-              </a:defRPr>
-            </a:lvl7pPr>
-            <a:lvl8pPr marR="0" lvl="7" algn="ctr" rtl="0">
-              <a:lnSpc>
-                <a:spcPct val="100000"/>
-              </a:lnSpc>
-              <a:spcBef>
-                <a:spcPts val="0"/>
-              </a:spcBef>
-              <a:spcAft>
-                <a:spcPts val="0"/>
-              </a:spcAft>
-              <a:buClr>
-                <a:schemeClr val="dk1"/>
-              </a:buClr>
-              <a:buSzPts val="5200"/>
-              <a:buFont typeface="Arial"/>
-              <a:buNone/>
-              <a:defRPr sz="5200" b="0" i="0" u="none" strike="noStrike" cap="none">
-                <a:solidFill>
-                  <a:schemeClr val="dk1"/>
-                </a:solidFill>
-                <a:latin typeface="Arial"/>
-                <a:ea typeface="Arial"/>
-                <a:cs typeface="Arial"/>
-                <a:sym typeface="Arial"/>
-              </a:defRPr>
-            </a:lvl8pPr>
-            <a:lvl9pPr marR="0" lvl="8" algn="ctr" rtl="0">
-              <a:lnSpc>
-                <a:spcPct val="100000"/>
-              </a:lnSpc>
-              <a:spcBef>
-                <a:spcPts val="0"/>
-              </a:spcBef>
-              <a:spcAft>
-                <a:spcPts val="0"/>
-              </a:spcAft>
-              <a:buClr>
-                <a:schemeClr val="dk1"/>
-              </a:buClr>
-              <a:buSzPts val="5200"/>
-              <a:buFont typeface="Arial"/>
-              <a:buNone/>
-              <a:defRPr sz="5200" b="0" i="0" u="none" strike="noStrike" cap="none">
-                <a:solidFill>
-                  <a:schemeClr val="dk1"/>
-                </a:solidFill>
-                <a:latin typeface="Arial"/>
-                <a:ea typeface="Arial"/>
-                <a:cs typeface="Arial"/>
-                <a:sym typeface="Arial"/>
-              </a:defRPr>
-            </a:lvl9pPr>
-          </a:lstStyle>
-          <a:p>
-            <a:pPr algn="l"/>
-            <a:r>
-              <a:rPr lang="nl-BE" sz="1400" dirty="0">
-                <a:latin typeface="Cascadia Mono" panose="020B0609020000020004" pitchFamily="49" charset="0"/>
-                <a:ea typeface="Cascadia Mono" panose="020B0609020000020004" pitchFamily="49" charset="0"/>
-                <a:cs typeface="Cascadia Mono" panose="020B0609020000020004" pitchFamily="49" charset="0"/>
-                <a:sym typeface="Montserrat"/>
-              </a:rPr>
-              <a:t>01/03/2022</a:t>
-            </a:r>
-          </a:p>
-        </p:txBody>
-      </p:sp>
     </p:spTree>
   </p:cSld>
   <p:clrMapOvr>
@@ -15809,298 +13765,6 @@
           </a:p>
         </p:txBody>
       </p:sp>
-      <p:sp>
-        <p:nvSpPr>
-          <p:cNvPr id="11" name="Google Shape;69;p15">
-            <a:extLst>
-              <a:ext uri="{FF2B5EF4-FFF2-40B4-BE49-F238E27FC236}">
-                <a16:creationId xmlns:a16="http://schemas.microsoft.com/office/drawing/2014/main" id="{FB626682-4280-4EFE-B5F3-070F084E9284}"/>
-              </a:ext>
-            </a:extLst>
-          </p:cNvPr>
-          <p:cNvSpPr txBox="1">
-            <a:spLocks/>
-          </p:cNvSpPr>
-          <p:nvPr/>
-        </p:nvSpPr>
-        <p:spPr>
-          <a:xfrm>
-            <a:off x="317513" y="6163056"/>
-            <a:ext cx="3140592" cy="438149"/>
-          </a:xfrm>
-          <a:prstGeom prst="rect">
-            <a:avLst/>
-          </a:prstGeom>
-          <a:noFill/>
-          <a:ln>
-            <a:noFill/>
-          </a:ln>
-        </p:spPr>
-        <p:txBody>
-          <a:bodyPr spcFirstLastPara="1" wrap="square" lIns="91425" tIns="91425" rIns="91425" bIns="91425" anchor="t" anchorCtr="0">
-            <a:noAutofit/>
-          </a:bodyPr>
-          <a:lstStyle>
-            <a:defPPr marR="0" lvl="0" algn="l" rtl="0">
-              <a:lnSpc>
-                <a:spcPct val="100000"/>
-              </a:lnSpc>
-              <a:spcBef>
-                <a:spcPts val="0"/>
-              </a:spcBef>
-              <a:spcAft>
-                <a:spcPts val="0"/>
-              </a:spcAft>
-            </a:defPPr>
-            <a:lvl1pPr marR="0" lvl="0" algn="ctr" rtl="0">
-              <a:lnSpc>
-                <a:spcPct val="100000"/>
-              </a:lnSpc>
-              <a:spcBef>
-                <a:spcPts val="0"/>
-              </a:spcBef>
-              <a:spcAft>
-                <a:spcPts val="0"/>
-              </a:spcAft>
-              <a:buClr>
-                <a:schemeClr val="dk1"/>
-              </a:buClr>
-              <a:buSzPts val="5200"/>
-              <a:buFont typeface="Arial"/>
-              <a:buNone/>
-              <a:defRPr sz="5200" b="0" i="0" u="none" strike="noStrike" cap="none">
-                <a:solidFill>
-                  <a:schemeClr val="dk1"/>
-                </a:solidFill>
-                <a:latin typeface="Arial"/>
-                <a:ea typeface="Arial"/>
-                <a:cs typeface="Arial"/>
-                <a:sym typeface="Arial"/>
-              </a:defRPr>
-            </a:lvl1pPr>
-            <a:lvl2pPr marR="0" lvl="1" algn="ctr" rtl="0">
-              <a:lnSpc>
-                <a:spcPct val="100000"/>
-              </a:lnSpc>
-              <a:spcBef>
-                <a:spcPts val="0"/>
-              </a:spcBef>
-              <a:spcAft>
-                <a:spcPts val="0"/>
-              </a:spcAft>
-              <a:buClr>
-                <a:schemeClr val="dk1"/>
-              </a:buClr>
-              <a:buSzPts val="5200"/>
-              <a:buFont typeface="Arial"/>
-              <a:buNone/>
-              <a:defRPr sz="5200" b="0" i="0" u="none" strike="noStrike" cap="none">
-                <a:solidFill>
-                  <a:schemeClr val="dk1"/>
-                </a:solidFill>
-                <a:latin typeface="Arial"/>
-                <a:ea typeface="Arial"/>
-                <a:cs typeface="Arial"/>
-                <a:sym typeface="Arial"/>
-              </a:defRPr>
-            </a:lvl2pPr>
-            <a:lvl3pPr marR="0" lvl="2" algn="ctr" rtl="0">
-              <a:lnSpc>
-                <a:spcPct val="100000"/>
-              </a:lnSpc>
-              <a:spcBef>
-                <a:spcPts val="0"/>
-              </a:spcBef>
-              <a:spcAft>
-                <a:spcPts val="0"/>
-              </a:spcAft>
-              <a:buClr>
-                <a:schemeClr val="dk1"/>
-              </a:buClr>
-              <a:buSzPts val="5200"/>
-              <a:buFont typeface="Arial"/>
-              <a:buNone/>
-              <a:defRPr sz="5200" b="0" i="0" u="none" strike="noStrike" cap="none">
-                <a:solidFill>
-                  <a:schemeClr val="dk1"/>
-                </a:solidFill>
-                <a:latin typeface="Arial"/>
-                <a:ea typeface="Arial"/>
-                <a:cs typeface="Arial"/>
-                <a:sym typeface="Arial"/>
-              </a:defRPr>
-            </a:lvl3pPr>
-            <a:lvl4pPr marR="0" lvl="3" algn="ctr" rtl="0">
-              <a:lnSpc>
-                <a:spcPct val="100000"/>
-              </a:lnSpc>
-              <a:spcBef>
-                <a:spcPts val="0"/>
-              </a:spcBef>
-              <a:spcAft>
-                <a:spcPts val="0"/>
-              </a:spcAft>
-              <a:buClr>
-                <a:schemeClr val="dk1"/>
-              </a:buClr>
-              <a:buSzPts val="5200"/>
-              <a:buFont typeface="Arial"/>
-              <a:buNone/>
-              <a:defRPr sz="5200" b="0" i="0" u="none" strike="noStrike" cap="none">
-                <a:solidFill>
-                  <a:schemeClr val="dk1"/>
-                </a:solidFill>
-                <a:latin typeface="Arial"/>
-                <a:ea typeface="Arial"/>
-                <a:cs typeface="Arial"/>
-                <a:sym typeface="Arial"/>
-              </a:defRPr>
-            </a:lvl4pPr>
-            <a:lvl5pPr marR="0" lvl="4" algn="ctr" rtl="0">
-              <a:lnSpc>
-                <a:spcPct val="100000"/>
-              </a:lnSpc>
-              <a:spcBef>
-                <a:spcPts val="0"/>
-              </a:spcBef>
-              <a:spcAft>
-                <a:spcPts val="0"/>
-              </a:spcAft>
-              <a:buClr>
-                <a:schemeClr val="dk1"/>
-              </a:buClr>
-              <a:buSzPts val="5200"/>
-              <a:buFont typeface="Arial"/>
-              <a:buNone/>
-              <a:defRPr sz="5200" b="0" i="0" u="none" strike="noStrike" cap="none">
-                <a:solidFill>
-                  <a:schemeClr val="dk1"/>
-                </a:solidFill>
-                <a:latin typeface="Arial"/>
-                <a:ea typeface="Arial"/>
-                <a:cs typeface="Arial"/>
-                <a:sym typeface="Arial"/>
-              </a:defRPr>
-            </a:lvl5pPr>
-            <a:lvl6pPr marR="0" lvl="5" algn="ctr" rtl="0">
-              <a:lnSpc>
-                <a:spcPct val="100000"/>
-              </a:lnSpc>
-              <a:spcBef>
-                <a:spcPts val="0"/>
-              </a:spcBef>
-              <a:spcAft>
-                <a:spcPts val="0"/>
-              </a:spcAft>
-              <a:buClr>
-                <a:schemeClr val="dk1"/>
-              </a:buClr>
-              <a:buSzPts val="5200"/>
-              <a:buFont typeface="Arial"/>
-              <a:buNone/>
-              <a:defRPr sz="5200" b="0" i="0" u="none" strike="noStrike" cap="none">
-                <a:solidFill>
-                  <a:schemeClr val="dk1"/>
-                </a:solidFill>
-                <a:latin typeface="Arial"/>
-                <a:ea typeface="Arial"/>
-                <a:cs typeface="Arial"/>
-                <a:sym typeface="Arial"/>
-              </a:defRPr>
-            </a:lvl6pPr>
-            <a:lvl7pPr marR="0" lvl="6" algn="ctr" rtl="0">
-              <a:lnSpc>
-                <a:spcPct val="100000"/>
-              </a:lnSpc>
-              <a:spcBef>
-                <a:spcPts val="0"/>
-              </a:spcBef>
-              <a:spcAft>
-                <a:spcPts val="0"/>
-              </a:spcAft>
-              <a:buClr>
-                <a:schemeClr val="dk1"/>
-              </a:buClr>
-              <a:buSzPts val="5200"/>
-              <a:buFont typeface="Arial"/>
-              <a:buNone/>
-              <a:defRPr sz="5200" b="0" i="0" u="none" strike="noStrike" cap="none">
-                <a:solidFill>
-                  <a:schemeClr val="dk1"/>
-                </a:solidFill>
-                <a:latin typeface="Arial"/>
-                <a:ea typeface="Arial"/>
-                <a:cs typeface="Arial"/>
-                <a:sym typeface="Arial"/>
-              </a:defRPr>
-            </a:lvl7pPr>
-            <a:lvl8pPr marR="0" lvl="7" algn="ctr" rtl="0">
-              <a:lnSpc>
-                <a:spcPct val="100000"/>
-              </a:lnSpc>
-              <a:spcBef>
-                <a:spcPts val="0"/>
-              </a:spcBef>
-              <a:spcAft>
-                <a:spcPts val="0"/>
-              </a:spcAft>
-              <a:buClr>
-                <a:schemeClr val="dk1"/>
-              </a:buClr>
-              <a:buSzPts val="5200"/>
-              <a:buFont typeface="Arial"/>
-              <a:buNone/>
-              <a:defRPr sz="5200" b="0" i="0" u="none" strike="noStrike" cap="none">
-                <a:solidFill>
-                  <a:schemeClr val="dk1"/>
-                </a:solidFill>
-                <a:latin typeface="Arial"/>
-                <a:ea typeface="Arial"/>
-                <a:cs typeface="Arial"/>
-                <a:sym typeface="Arial"/>
-              </a:defRPr>
-            </a:lvl8pPr>
-            <a:lvl9pPr marR="0" lvl="8" algn="ctr" rtl="0">
-              <a:lnSpc>
-                <a:spcPct val="100000"/>
-              </a:lnSpc>
-              <a:spcBef>
-                <a:spcPts val="0"/>
-              </a:spcBef>
-              <a:spcAft>
-                <a:spcPts val="0"/>
-              </a:spcAft>
-              <a:buClr>
-                <a:schemeClr val="dk1"/>
-              </a:buClr>
-              <a:buSzPts val="5200"/>
-              <a:buFont typeface="Arial"/>
-              <a:buNone/>
-              <a:defRPr sz="5200" b="0" i="0" u="none" strike="noStrike" cap="none">
-                <a:solidFill>
-                  <a:schemeClr val="dk1"/>
-                </a:solidFill>
-                <a:latin typeface="Arial"/>
-                <a:ea typeface="Arial"/>
-                <a:cs typeface="Arial"/>
-                <a:sym typeface="Arial"/>
-              </a:defRPr>
-            </a:lvl9pPr>
-          </a:lstStyle>
-          <a:p>
-            <a:pPr algn="l"/>
-            <a:r>
-              <a:rPr lang="nl-BE" sz="1400" dirty="0">
-                <a:latin typeface="Cascadia Mono" panose="020B0609020000020004" pitchFamily="49" charset="0"/>
-                <a:ea typeface="Cascadia Mono" panose="020B0609020000020004" pitchFamily="49" charset="0"/>
-                <a:cs typeface="Cascadia Mono" panose="020B0609020000020004" pitchFamily="49" charset="0"/>
-                <a:sym typeface="Montserrat"/>
-              </a:rPr>
-              <a:t>01/03/2022</a:t>
-            </a:r>
-          </a:p>
-        </p:txBody>
-      </p:sp>
     </p:spTree>
   </p:cSld>
   <p:clrMapOvr>
@@ -16730,298 +14394,6 @@
                 <a:sym typeface="Montserrat"/>
               </a:rPr>
               <a:t>Python Fundamentals – Les017</a:t>
-            </a:r>
-          </a:p>
-        </p:txBody>
-      </p:sp>
-      <p:sp>
-        <p:nvSpPr>
-          <p:cNvPr id="12" name="Google Shape;69;p15">
-            <a:extLst>
-              <a:ext uri="{FF2B5EF4-FFF2-40B4-BE49-F238E27FC236}">
-                <a16:creationId xmlns:a16="http://schemas.microsoft.com/office/drawing/2014/main" id="{5438D780-BDE6-4055-AD19-6392D7DD49A0}"/>
-              </a:ext>
-            </a:extLst>
-          </p:cNvPr>
-          <p:cNvSpPr txBox="1">
-            <a:spLocks/>
-          </p:cNvSpPr>
-          <p:nvPr/>
-        </p:nvSpPr>
-        <p:spPr>
-          <a:xfrm>
-            <a:off x="317513" y="6163056"/>
-            <a:ext cx="3140592" cy="438149"/>
-          </a:xfrm>
-          <a:prstGeom prst="rect">
-            <a:avLst/>
-          </a:prstGeom>
-          <a:noFill/>
-          <a:ln>
-            <a:noFill/>
-          </a:ln>
-        </p:spPr>
-        <p:txBody>
-          <a:bodyPr spcFirstLastPara="1" wrap="square" lIns="91425" tIns="91425" rIns="91425" bIns="91425" anchor="t" anchorCtr="0">
-            <a:noAutofit/>
-          </a:bodyPr>
-          <a:lstStyle>
-            <a:defPPr marR="0" lvl="0" algn="l" rtl="0">
-              <a:lnSpc>
-                <a:spcPct val="100000"/>
-              </a:lnSpc>
-              <a:spcBef>
-                <a:spcPts val="0"/>
-              </a:spcBef>
-              <a:spcAft>
-                <a:spcPts val="0"/>
-              </a:spcAft>
-            </a:defPPr>
-            <a:lvl1pPr marR="0" lvl="0" algn="ctr" rtl="0">
-              <a:lnSpc>
-                <a:spcPct val="100000"/>
-              </a:lnSpc>
-              <a:spcBef>
-                <a:spcPts val="0"/>
-              </a:spcBef>
-              <a:spcAft>
-                <a:spcPts val="0"/>
-              </a:spcAft>
-              <a:buClr>
-                <a:schemeClr val="dk1"/>
-              </a:buClr>
-              <a:buSzPts val="5200"/>
-              <a:buFont typeface="Arial"/>
-              <a:buNone/>
-              <a:defRPr sz="5200" b="0" i="0" u="none" strike="noStrike" cap="none">
-                <a:solidFill>
-                  <a:schemeClr val="dk1"/>
-                </a:solidFill>
-                <a:latin typeface="Arial"/>
-                <a:ea typeface="Arial"/>
-                <a:cs typeface="Arial"/>
-                <a:sym typeface="Arial"/>
-              </a:defRPr>
-            </a:lvl1pPr>
-            <a:lvl2pPr marR="0" lvl="1" algn="ctr" rtl="0">
-              <a:lnSpc>
-                <a:spcPct val="100000"/>
-              </a:lnSpc>
-              <a:spcBef>
-                <a:spcPts val="0"/>
-              </a:spcBef>
-              <a:spcAft>
-                <a:spcPts val="0"/>
-              </a:spcAft>
-              <a:buClr>
-                <a:schemeClr val="dk1"/>
-              </a:buClr>
-              <a:buSzPts val="5200"/>
-              <a:buFont typeface="Arial"/>
-              <a:buNone/>
-              <a:defRPr sz="5200" b="0" i="0" u="none" strike="noStrike" cap="none">
-                <a:solidFill>
-                  <a:schemeClr val="dk1"/>
-                </a:solidFill>
-                <a:latin typeface="Arial"/>
-                <a:ea typeface="Arial"/>
-                <a:cs typeface="Arial"/>
-                <a:sym typeface="Arial"/>
-              </a:defRPr>
-            </a:lvl2pPr>
-            <a:lvl3pPr marR="0" lvl="2" algn="ctr" rtl="0">
-              <a:lnSpc>
-                <a:spcPct val="100000"/>
-              </a:lnSpc>
-              <a:spcBef>
-                <a:spcPts val="0"/>
-              </a:spcBef>
-              <a:spcAft>
-                <a:spcPts val="0"/>
-              </a:spcAft>
-              <a:buClr>
-                <a:schemeClr val="dk1"/>
-              </a:buClr>
-              <a:buSzPts val="5200"/>
-              <a:buFont typeface="Arial"/>
-              <a:buNone/>
-              <a:defRPr sz="5200" b="0" i="0" u="none" strike="noStrike" cap="none">
-                <a:solidFill>
-                  <a:schemeClr val="dk1"/>
-                </a:solidFill>
-                <a:latin typeface="Arial"/>
-                <a:ea typeface="Arial"/>
-                <a:cs typeface="Arial"/>
-                <a:sym typeface="Arial"/>
-              </a:defRPr>
-            </a:lvl3pPr>
-            <a:lvl4pPr marR="0" lvl="3" algn="ctr" rtl="0">
-              <a:lnSpc>
-                <a:spcPct val="100000"/>
-              </a:lnSpc>
-              <a:spcBef>
-                <a:spcPts val="0"/>
-              </a:spcBef>
-              <a:spcAft>
-                <a:spcPts val="0"/>
-              </a:spcAft>
-              <a:buClr>
-                <a:schemeClr val="dk1"/>
-              </a:buClr>
-              <a:buSzPts val="5200"/>
-              <a:buFont typeface="Arial"/>
-              <a:buNone/>
-              <a:defRPr sz="5200" b="0" i="0" u="none" strike="noStrike" cap="none">
-                <a:solidFill>
-                  <a:schemeClr val="dk1"/>
-                </a:solidFill>
-                <a:latin typeface="Arial"/>
-                <a:ea typeface="Arial"/>
-                <a:cs typeface="Arial"/>
-                <a:sym typeface="Arial"/>
-              </a:defRPr>
-            </a:lvl4pPr>
-            <a:lvl5pPr marR="0" lvl="4" algn="ctr" rtl="0">
-              <a:lnSpc>
-                <a:spcPct val="100000"/>
-              </a:lnSpc>
-              <a:spcBef>
-                <a:spcPts val="0"/>
-              </a:spcBef>
-              <a:spcAft>
-                <a:spcPts val="0"/>
-              </a:spcAft>
-              <a:buClr>
-                <a:schemeClr val="dk1"/>
-              </a:buClr>
-              <a:buSzPts val="5200"/>
-              <a:buFont typeface="Arial"/>
-              <a:buNone/>
-              <a:defRPr sz="5200" b="0" i="0" u="none" strike="noStrike" cap="none">
-                <a:solidFill>
-                  <a:schemeClr val="dk1"/>
-                </a:solidFill>
-                <a:latin typeface="Arial"/>
-                <a:ea typeface="Arial"/>
-                <a:cs typeface="Arial"/>
-                <a:sym typeface="Arial"/>
-              </a:defRPr>
-            </a:lvl5pPr>
-            <a:lvl6pPr marR="0" lvl="5" algn="ctr" rtl="0">
-              <a:lnSpc>
-                <a:spcPct val="100000"/>
-              </a:lnSpc>
-              <a:spcBef>
-                <a:spcPts val="0"/>
-              </a:spcBef>
-              <a:spcAft>
-                <a:spcPts val="0"/>
-              </a:spcAft>
-              <a:buClr>
-                <a:schemeClr val="dk1"/>
-              </a:buClr>
-              <a:buSzPts val="5200"/>
-              <a:buFont typeface="Arial"/>
-              <a:buNone/>
-              <a:defRPr sz="5200" b="0" i="0" u="none" strike="noStrike" cap="none">
-                <a:solidFill>
-                  <a:schemeClr val="dk1"/>
-                </a:solidFill>
-                <a:latin typeface="Arial"/>
-                <a:ea typeface="Arial"/>
-                <a:cs typeface="Arial"/>
-                <a:sym typeface="Arial"/>
-              </a:defRPr>
-            </a:lvl6pPr>
-            <a:lvl7pPr marR="0" lvl="6" algn="ctr" rtl="0">
-              <a:lnSpc>
-                <a:spcPct val="100000"/>
-              </a:lnSpc>
-              <a:spcBef>
-                <a:spcPts val="0"/>
-              </a:spcBef>
-              <a:spcAft>
-                <a:spcPts val="0"/>
-              </a:spcAft>
-              <a:buClr>
-                <a:schemeClr val="dk1"/>
-              </a:buClr>
-              <a:buSzPts val="5200"/>
-              <a:buFont typeface="Arial"/>
-              <a:buNone/>
-              <a:defRPr sz="5200" b="0" i="0" u="none" strike="noStrike" cap="none">
-                <a:solidFill>
-                  <a:schemeClr val="dk1"/>
-                </a:solidFill>
-                <a:latin typeface="Arial"/>
-                <a:ea typeface="Arial"/>
-                <a:cs typeface="Arial"/>
-                <a:sym typeface="Arial"/>
-              </a:defRPr>
-            </a:lvl7pPr>
-            <a:lvl8pPr marR="0" lvl="7" algn="ctr" rtl="0">
-              <a:lnSpc>
-                <a:spcPct val="100000"/>
-              </a:lnSpc>
-              <a:spcBef>
-                <a:spcPts val="0"/>
-              </a:spcBef>
-              <a:spcAft>
-                <a:spcPts val="0"/>
-              </a:spcAft>
-              <a:buClr>
-                <a:schemeClr val="dk1"/>
-              </a:buClr>
-              <a:buSzPts val="5200"/>
-              <a:buFont typeface="Arial"/>
-              <a:buNone/>
-              <a:defRPr sz="5200" b="0" i="0" u="none" strike="noStrike" cap="none">
-                <a:solidFill>
-                  <a:schemeClr val="dk1"/>
-                </a:solidFill>
-                <a:latin typeface="Arial"/>
-                <a:ea typeface="Arial"/>
-                <a:cs typeface="Arial"/>
-                <a:sym typeface="Arial"/>
-              </a:defRPr>
-            </a:lvl8pPr>
-            <a:lvl9pPr marR="0" lvl="8" algn="ctr" rtl="0">
-              <a:lnSpc>
-                <a:spcPct val="100000"/>
-              </a:lnSpc>
-              <a:spcBef>
-                <a:spcPts val="0"/>
-              </a:spcBef>
-              <a:spcAft>
-                <a:spcPts val="0"/>
-              </a:spcAft>
-              <a:buClr>
-                <a:schemeClr val="dk1"/>
-              </a:buClr>
-              <a:buSzPts val="5200"/>
-              <a:buFont typeface="Arial"/>
-              <a:buNone/>
-              <a:defRPr sz="5200" b="0" i="0" u="none" strike="noStrike" cap="none">
-                <a:solidFill>
-                  <a:schemeClr val="dk1"/>
-                </a:solidFill>
-                <a:latin typeface="Arial"/>
-                <a:ea typeface="Arial"/>
-                <a:cs typeface="Arial"/>
-                <a:sym typeface="Arial"/>
-              </a:defRPr>
-            </a:lvl9pPr>
-          </a:lstStyle>
-          <a:p>
-            <a:pPr algn="l"/>
-            <a:r>
-              <a:rPr lang="nl-BE" sz="1400" dirty="0">
-                <a:latin typeface="Cascadia Mono" panose="020B0609020000020004" pitchFamily="49" charset="0"/>
-                <a:ea typeface="Cascadia Mono" panose="020B0609020000020004" pitchFamily="49" charset="0"/>
-                <a:cs typeface="Cascadia Mono" panose="020B0609020000020004" pitchFamily="49" charset="0"/>
-                <a:sym typeface="Montserrat"/>
-              </a:rPr>
-              <a:t>01/03/2022</a:t>
             </a:r>
           </a:p>
         </p:txBody>
@@ -18009,6 +15381,14 @@
 </file>
 
 <file path=customXml/item2.xml><?xml version="1.0" encoding="utf-8"?>
+<p:properties xmlns:p="http://schemas.microsoft.com/office/2006/metadata/properties" xmlns:xsi="http://www.w3.org/2001/XMLSchema-instance" xmlns:pc="http://schemas.microsoft.com/office/infopath/2007/PartnerControls">
+  <documentManagement>
+    <MediaLengthInSeconds xmlns="4fce6d0c-2df1-41ae-b231-b2281c3c593b" xsi:nil="true"/>
+  </documentManagement>
+</p:properties>
+</file>
+
+<file path=customXml/item3.xml><?xml version="1.0" encoding="utf-8"?>
 <?mso-contentType ?>
 <FormTemplates xmlns="http://schemas.microsoft.com/sharepoint/v3/contenttype/forms">
   <Display>DocumentLibraryForm</Display>
@@ -18017,22 +15397,38 @@
 </FormTemplates>
 </file>
 
-<file path=customXml/item3.xml><?xml version="1.0" encoding="utf-8"?>
-<p:properties xmlns:p="http://schemas.microsoft.com/office/2006/metadata/properties" xmlns:xsi="http://www.w3.org/2001/XMLSchema-instance" xmlns:pc="http://schemas.microsoft.com/office/infopath/2007/PartnerControls">
-  <documentManagement>
-    <MediaLengthInSeconds xmlns="4fce6d0c-2df1-41ae-b231-b2281c3c593b" xsi:nil="true"/>
-  </documentManagement>
-</p:properties>
-</file>
-
 <file path=customXml/itemProps1.xml><?xml version="1.0" encoding="utf-8"?>
-<ds:datastoreItem xmlns:ds="http://schemas.openxmlformats.org/officeDocument/2006/customXml" ds:itemID="{D3C4F6A7-B719-4250-95FF-8011D16FF3EE}"/>
+<ds:datastoreItem xmlns:ds="http://schemas.openxmlformats.org/officeDocument/2006/customXml" ds:itemID="{D3C4F6A7-B719-4250-95FF-8011D16FF3EE}">
+  <ds:schemaRefs>
+    <ds:schemaRef ds:uri="http://schemas.microsoft.com/office/2006/metadata/contentType"/>
+    <ds:schemaRef ds:uri="http://schemas.microsoft.com/office/2006/metadata/properties/metaAttributes"/>
+    <ds:schemaRef ds:uri="http://www.w3.org/2001/XMLSchema"/>
+    <ds:schemaRef ds:uri="http://schemas.microsoft.com/office/2006/metadata/properties"/>
+    <ds:schemaRef ds:uri="4fce6d0c-2df1-41ae-b231-b2281c3c593b"/>
+    <ds:schemaRef ds:uri="http://schemas.microsoft.com/office/2006/documentManagement/types"/>
+    <ds:schemaRef ds:uri="http://schemas.microsoft.com/office/infopath/2007/PartnerControls"/>
+    <ds:schemaRef ds:uri="http://schemas.openxmlformats.org/package/2006/metadata/core-properties"/>
+    <ds:schemaRef ds:uri="http://purl.org/dc/elements/1.1/"/>
+    <ds:schemaRef ds:uri="http://purl.org/dc/terms/"/>
+    <ds:schemaRef ds:uri="http://schemas.microsoft.com/internal/obd"/>
+  </ds:schemaRefs>
+</ds:datastoreItem>
 </file>
 
 <file path=customXml/itemProps2.xml><?xml version="1.0" encoding="utf-8"?>
-<ds:datastoreItem xmlns:ds="http://schemas.openxmlformats.org/officeDocument/2006/customXml" ds:itemID="{4681EF4D-5A7B-40FE-AA80-08ECE18D4881}"/>
+<ds:datastoreItem xmlns:ds="http://schemas.openxmlformats.org/officeDocument/2006/customXml" ds:itemID="{BF1DB37E-29AF-4A41-AF53-ADB9D4A3CC96}">
+  <ds:schemaRefs>
+    <ds:schemaRef ds:uri="http://schemas.microsoft.com/office/2006/metadata/properties"/>
+    <ds:schemaRef ds:uri="http://schemas.microsoft.com/office/infopath/2007/PartnerControls"/>
+    <ds:schemaRef ds:uri="4fce6d0c-2df1-41ae-b231-b2281c3c593b"/>
+  </ds:schemaRefs>
+</ds:datastoreItem>
 </file>
 
 <file path=customXml/itemProps3.xml><?xml version="1.0" encoding="utf-8"?>
-<ds:datastoreItem xmlns:ds="http://schemas.openxmlformats.org/officeDocument/2006/customXml" ds:itemID="{BF1DB37E-29AF-4A41-AF53-ADB9D4A3CC96}"/>
+<ds:datastoreItem xmlns:ds="http://schemas.openxmlformats.org/officeDocument/2006/customXml" ds:itemID="{4681EF4D-5A7B-40FE-AA80-08ECE18D4881}">
+  <ds:schemaRefs>
+    <ds:schemaRef ds:uri="http://schemas.microsoft.com/sharepoint/v3/contenttype/forms"/>
+  </ds:schemaRefs>
+</ds:datastoreItem>
 </file>
</xml_diff>